<commit_message>
Dani updated proposal and notes
</commit_message>
<xml_diff>
--- a/documents/proposal_as_ppt.pptx
+++ b/documents/proposal_as_ppt.pptx
@@ -116,6 +116,11 @@
       </a:defRPr>
     </a:lvl9pPr>
   </p:defaultTextStyle>
+  <p:extLst>
+    <p:ext uri="{EFAFB233-063F-42B5-8137-9DF3F51BA10A}">
+      <p15:sldGuideLst xmlns:p15="http://schemas.microsoft.com/office/powerpoint/2012/main"/>
+    </p:ext>
+  </p:extLst>
 </p:presentation>
 </file>
 
@@ -201,7 +206,7 @@
           <a:p>
             <a:fld id="{D45F478C-19B8-4007-85C0-1B1FB6679583}" type="datetimeFigureOut">
               <a:rPr lang="en-GB" smtClean="0"/>
-              <a:t>04/03/2024</a:t>
+              <a:t>14/03/2024</a:t>
             </a:fld>
             <a:endParaRPr lang="en-GB"/>
           </a:p>
@@ -709,7 +714,7 @@
           <a:p>
             <a:fld id="{3C6FA151-EAC5-464A-86BA-1012663BC30E}" type="datetime1">
               <a:rPr lang="en-GB" smtClean="0"/>
-              <a:t>04/03/2024</a:t>
+              <a:t>14/03/2024</a:t>
             </a:fld>
             <a:endParaRPr lang="en-GB"/>
           </a:p>
@@ -912,7 +917,7 @@
           <a:p>
             <a:fld id="{5801DCF2-7C1D-4561-A029-2852EF5D2072}" type="datetime1">
               <a:rPr lang="en-GB" smtClean="0"/>
-              <a:t>04/03/2024</a:t>
+              <a:t>14/03/2024</a:t>
             </a:fld>
             <a:endParaRPr lang="en-GB"/>
           </a:p>
@@ -1125,7 +1130,7 @@
           <a:p>
             <a:fld id="{7619F4D1-41EA-4C45-AE34-CFD01CAAE541}" type="datetime1">
               <a:rPr lang="en-GB" smtClean="0"/>
-              <a:t>04/03/2024</a:t>
+              <a:t>14/03/2024</a:t>
             </a:fld>
             <a:endParaRPr lang="en-GB"/>
           </a:p>
@@ -1328,7 +1333,7 @@
           <a:p>
             <a:fld id="{676ADB0C-2706-41C4-9D6D-FDE2B8D9A78E}" type="datetime1">
               <a:rPr lang="en-GB" smtClean="0"/>
-              <a:t>04/03/2024</a:t>
+              <a:t>14/03/2024</a:t>
             </a:fld>
             <a:endParaRPr lang="en-GB"/>
           </a:p>
@@ -1607,7 +1612,7 @@
           <a:p>
             <a:fld id="{CA1DA76A-A919-473D-B354-18365EADF2F5}" type="datetime1">
               <a:rPr lang="en-GB" smtClean="0"/>
-              <a:t>04/03/2024</a:t>
+              <a:t>14/03/2024</a:t>
             </a:fld>
             <a:endParaRPr lang="en-GB"/>
           </a:p>
@@ -1878,7 +1883,7 @@
           <a:p>
             <a:fld id="{E51BBD68-46CA-4165-816E-CD8C056875FC}" type="datetime1">
               <a:rPr lang="en-GB" smtClean="0"/>
-              <a:t>04/03/2024</a:t>
+              <a:t>14/03/2024</a:t>
             </a:fld>
             <a:endParaRPr lang="en-GB"/>
           </a:p>
@@ -2296,7 +2301,7 @@
           <a:p>
             <a:fld id="{B2FAE00B-F786-4A05-8A94-4E14BC77E290}" type="datetime1">
               <a:rPr lang="en-GB" smtClean="0"/>
-              <a:t>04/03/2024</a:t>
+              <a:t>14/03/2024</a:t>
             </a:fld>
             <a:endParaRPr lang="en-GB"/>
           </a:p>
@@ -2441,7 +2446,7 @@
           <a:p>
             <a:fld id="{2017125D-372F-403A-BE3C-7D72C6C3FDF5}" type="datetime1">
               <a:rPr lang="en-GB" smtClean="0"/>
-              <a:t>04/03/2024</a:t>
+              <a:t>14/03/2024</a:t>
             </a:fld>
             <a:endParaRPr lang="en-GB"/>
           </a:p>
@@ -2557,7 +2562,7 @@
           <a:p>
             <a:fld id="{220398F7-D689-461D-B713-9ACC4E34E2F6}" type="datetime1">
               <a:rPr lang="en-GB" smtClean="0"/>
-              <a:t>04/03/2024</a:t>
+              <a:t>14/03/2024</a:t>
             </a:fld>
             <a:endParaRPr lang="en-GB"/>
           </a:p>
@@ -2873,7 +2878,7 @@
           <a:p>
             <a:fld id="{043CA75F-4FC6-4A09-B610-681E3F3B6E7D}" type="datetime1">
               <a:rPr lang="en-GB" smtClean="0"/>
-              <a:t>04/03/2024</a:t>
+              <a:t>14/03/2024</a:t>
             </a:fld>
             <a:endParaRPr lang="en-GB"/>
           </a:p>
@@ -3165,7 +3170,7 @@
           <a:p>
             <a:fld id="{4F9D3380-6300-4980-85F1-73CEABF7B00C}" type="datetime1">
               <a:rPr lang="en-GB" smtClean="0"/>
-              <a:t>04/03/2024</a:t>
+              <a:t>14/03/2024</a:t>
             </a:fld>
             <a:endParaRPr lang="en-GB"/>
           </a:p>
@@ -3411,7 +3416,7 @@
           <a:p>
             <a:fld id="{115F3E82-D6CD-4F98-8A25-92742025E9CB}" type="datetime1">
               <a:rPr lang="en-GB" smtClean="0"/>
-              <a:t>04/03/2024</a:t>
+              <a:t>14/03/2024</a:t>
             </a:fld>
             <a:endParaRPr lang="en-GB"/>
           </a:p>
@@ -6181,6 +6186,87 @@
           </a:extLst>
         </p:spPr>
       </p:pic>
+      <p:grpSp>
+        <p:nvGrpSpPr>
+          <p:cNvPr id="10" name="Group 9">
+            <a:extLst>
+              <a:ext uri="{FF2B5EF4-FFF2-40B4-BE49-F238E27FC236}">
+                <a16:creationId xmlns:a16="http://schemas.microsoft.com/office/drawing/2014/main" id="{D1586986-0D81-D4CC-75E7-8B1B45C0E99B}"/>
+              </a:ext>
+            </a:extLst>
+          </p:cNvPr>
+          <p:cNvGrpSpPr/>
+          <p:nvPr/>
+        </p:nvGrpSpPr>
+        <p:grpSpPr>
+          <a:xfrm>
+            <a:off x="3752729" y="136525"/>
+            <a:ext cx="4686541" cy="6928207"/>
+            <a:chOff x="3752729" y="136525"/>
+            <a:chExt cx="4686541" cy="6928207"/>
+          </a:xfrm>
+        </p:grpSpPr>
+        <p:pic>
+          <p:nvPicPr>
+            <p:cNvPr id="6" name="Picture 5">
+              <a:extLst>
+                <a:ext uri="{FF2B5EF4-FFF2-40B4-BE49-F238E27FC236}">
+                  <a16:creationId xmlns:a16="http://schemas.microsoft.com/office/drawing/2014/main" id="{22AC2898-02F7-9122-A6BE-9096975A3917}"/>
+                </a:ext>
+              </a:extLst>
+            </p:cNvPr>
+            <p:cNvPicPr>
+              <a:picLocks noChangeAspect="1"/>
+            </p:cNvPicPr>
+            <p:nvPr/>
+          </p:nvPicPr>
+          <p:blipFill>
+            <a:blip r:embed="rId4"/>
+            <a:stretch>
+              <a:fillRect/>
+            </a:stretch>
+          </p:blipFill>
+          <p:spPr>
+            <a:xfrm>
+              <a:off x="3752729" y="136525"/>
+              <a:ext cx="4686541" cy="4210266"/>
+            </a:xfrm>
+            <a:prstGeom prst="rect">
+              <a:avLst/>
+            </a:prstGeom>
+          </p:spPr>
+        </p:pic>
+        <p:pic>
+          <p:nvPicPr>
+            <p:cNvPr id="9" name="Picture 8">
+              <a:extLst>
+                <a:ext uri="{FF2B5EF4-FFF2-40B4-BE49-F238E27FC236}">
+                  <a16:creationId xmlns:a16="http://schemas.microsoft.com/office/drawing/2014/main" id="{28A507F9-5F72-0559-AE6B-D8F1E0DE3A65}"/>
+                </a:ext>
+              </a:extLst>
+            </p:cNvPr>
+            <p:cNvPicPr>
+              <a:picLocks noChangeAspect="1"/>
+            </p:cNvPicPr>
+            <p:nvPr/>
+          </p:nvPicPr>
+          <p:blipFill>
+            <a:blip r:embed="rId5"/>
+            <a:stretch>
+              <a:fillRect/>
+            </a:stretch>
+          </p:blipFill>
+          <p:spPr>
+            <a:xfrm>
+              <a:off x="3752729" y="4315041"/>
+              <a:ext cx="4673840" cy="2749691"/>
+            </a:xfrm>
+            <a:prstGeom prst="rect">
+              <a:avLst/>
+            </a:prstGeom>
+          </p:spPr>
+        </p:pic>
+      </p:grpSp>
     </p:spTree>
     <p:extLst>
       <p:ext uri="{BB962C8B-B14F-4D97-AF65-F5344CB8AC3E}">

</xml_diff>

<commit_message>
Dani updated ppt and proposal
</commit_message>
<xml_diff>
--- a/documents/proposal_as_ppt.pptx
+++ b/documents/proposal_as_ppt.pptx
@@ -5,7 +5,7 @@
     <p:sldMasterId id="2147483648" r:id="rId1"/>
   </p:sldMasterIdLst>
   <p:notesMasterIdLst>
-    <p:notesMasterId r:id="rId18"/>
+    <p:notesMasterId r:id="rId19"/>
   </p:notesMasterIdLst>
   <p:sldIdLst>
     <p:sldId id="256" r:id="rId2"/>
@@ -13,17 +13,18 @@
     <p:sldId id="259" r:id="rId4"/>
     <p:sldId id="260" r:id="rId5"/>
     <p:sldId id="261" r:id="rId6"/>
-    <p:sldId id="266" r:id="rId7"/>
-    <p:sldId id="262" r:id="rId8"/>
-    <p:sldId id="267" r:id="rId9"/>
-    <p:sldId id="263" r:id="rId10"/>
-    <p:sldId id="270" r:id="rId11"/>
-    <p:sldId id="264" r:id="rId12"/>
-    <p:sldId id="271" r:id="rId13"/>
-    <p:sldId id="273" r:id="rId14"/>
-    <p:sldId id="265" r:id="rId15"/>
-    <p:sldId id="272" r:id="rId16"/>
-    <p:sldId id="268" r:id="rId17"/>
+    <p:sldId id="274" r:id="rId7"/>
+    <p:sldId id="266" r:id="rId8"/>
+    <p:sldId id="262" r:id="rId9"/>
+    <p:sldId id="267" r:id="rId10"/>
+    <p:sldId id="263" r:id="rId11"/>
+    <p:sldId id="270" r:id="rId12"/>
+    <p:sldId id="264" r:id="rId13"/>
+    <p:sldId id="271" r:id="rId14"/>
+    <p:sldId id="273" r:id="rId15"/>
+    <p:sldId id="265" r:id="rId16"/>
+    <p:sldId id="272" r:id="rId17"/>
+    <p:sldId id="268" r:id="rId18"/>
   </p:sldIdLst>
   <p:sldSz cx="12192000" cy="6858000"/>
   <p:notesSz cx="6858000" cy="9144000"/>
@@ -1256,7 +1257,7 @@
           <a:p>
             <a:fld id="{D45F478C-19B8-4007-85C0-1B1FB6679583}" type="datetimeFigureOut">
               <a:rPr lang="en-GB" smtClean="0"/>
-              <a:t>02/04/2024</a:t>
+              <a:t>03/04/2024</a:t>
             </a:fld>
             <a:endParaRPr lang="en-GB"/>
           </a:p>
@@ -1524,6 +1525,90 @@
 </p:notesMaster>
 </file>
 
+<file path=ppt/notesSlides/notesSlide1.xml><?xml version="1.0" encoding="utf-8"?>
+<p:notes xmlns:a="http://schemas.openxmlformats.org/drawingml/2006/main" xmlns:r="http://schemas.openxmlformats.org/officeDocument/2006/relationships" xmlns:p="http://schemas.openxmlformats.org/presentationml/2006/main">
+  <p:cSld>
+    <p:spTree>
+      <p:nvGrpSpPr>
+        <p:cNvPr id="1" name=""/>
+        <p:cNvGrpSpPr/>
+        <p:nvPr/>
+      </p:nvGrpSpPr>
+      <p:grpSpPr>
+        <a:xfrm>
+          <a:off x="0" y="0"/>
+          <a:ext cx="0" cy="0"/>
+          <a:chOff x="0" y="0"/>
+          <a:chExt cx="0" cy="0"/>
+        </a:xfrm>
+      </p:grpSpPr>
+      <p:sp>
+        <p:nvSpPr>
+          <p:cNvPr id="2" name="Slide Image Placeholder 1"/>
+          <p:cNvSpPr>
+            <a:spLocks noGrp="1" noRot="1" noChangeAspect="1"/>
+          </p:cNvSpPr>
+          <p:nvPr>
+            <p:ph type="sldImg"/>
+          </p:nvPr>
+        </p:nvSpPr>
+        <p:spPr/>
+      </p:sp>
+      <p:sp>
+        <p:nvSpPr>
+          <p:cNvPr id="3" name="Notes Placeholder 2"/>
+          <p:cNvSpPr>
+            <a:spLocks noGrp="1"/>
+          </p:cNvSpPr>
+          <p:nvPr>
+            <p:ph type="body" idx="1"/>
+          </p:nvPr>
+        </p:nvSpPr>
+        <p:spPr/>
+        <p:txBody>
+          <a:bodyPr/>
+          <a:lstStyle/>
+          <a:p>
+            <a:endParaRPr lang="en-GB" dirty="0"/>
+          </a:p>
+        </p:txBody>
+      </p:sp>
+      <p:sp>
+        <p:nvSpPr>
+          <p:cNvPr id="4" name="Slide Number Placeholder 3"/>
+          <p:cNvSpPr>
+            <a:spLocks noGrp="1"/>
+          </p:cNvSpPr>
+          <p:nvPr>
+            <p:ph type="sldNum" sz="quarter" idx="5"/>
+          </p:nvPr>
+        </p:nvSpPr>
+        <p:spPr/>
+        <p:txBody>
+          <a:bodyPr/>
+          <a:lstStyle/>
+          <a:p>
+            <a:fld id="{C3707A93-D292-4EC6-B140-C4EA6EF63E44}" type="slidenum">
+              <a:rPr lang="en-GB" smtClean="0"/>
+              <a:t>6</a:t>
+            </a:fld>
+            <a:endParaRPr lang="en-GB"/>
+          </a:p>
+        </p:txBody>
+      </p:sp>
+    </p:spTree>
+    <p:extLst>
+      <p:ext uri="{BB962C8B-B14F-4D97-AF65-F5344CB8AC3E}">
+        <p14:creationId xmlns:p14="http://schemas.microsoft.com/office/powerpoint/2010/main" val="2001843593"/>
+      </p:ext>
+    </p:extLst>
+  </p:cSld>
+  <p:clrMapOvr>
+    <a:masterClrMapping/>
+  </p:clrMapOvr>
+</p:notes>
+</file>
+
 <file path=ppt/slideLayouts/slideLayout1.xml><?xml version="1.0" encoding="utf-8"?>
 <p:sldLayout xmlns:a="http://schemas.openxmlformats.org/drawingml/2006/main" xmlns:r="http://schemas.openxmlformats.org/officeDocument/2006/relationships" xmlns:p="http://schemas.openxmlformats.org/presentationml/2006/main" type="title" preserve="1">
   <p:cSld name="Title Slide">
@@ -1673,7 +1758,7 @@
           <a:p>
             <a:fld id="{3C6FA151-EAC5-464A-86BA-1012663BC30E}" type="datetime1">
               <a:rPr lang="en-GB" smtClean="0"/>
-              <a:t>02/04/2024</a:t>
+              <a:t>03/04/2024</a:t>
             </a:fld>
             <a:endParaRPr lang="en-GB"/>
           </a:p>
@@ -1876,7 +1961,7 @@
           <a:p>
             <a:fld id="{5801DCF2-7C1D-4561-A029-2852EF5D2072}" type="datetime1">
               <a:rPr lang="en-GB" smtClean="0"/>
-              <a:t>02/04/2024</a:t>
+              <a:t>03/04/2024</a:t>
             </a:fld>
             <a:endParaRPr lang="en-GB"/>
           </a:p>
@@ -2089,7 +2174,7 @@
           <a:p>
             <a:fld id="{7619F4D1-41EA-4C45-AE34-CFD01CAAE541}" type="datetime1">
               <a:rPr lang="en-GB" smtClean="0"/>
-              <a:t>02/04/2024</a:t>
+              <a:t>03/04/2024</a:t>
             </a:fld>
             <a:endParaRPr lang="en-GB"/>
           </a:p>
@@ -2292,7 +2377,7 @@
           <a:p>
             <a:fld id="{676ADB0C-2706-41C4-9D6D-FDE2B8D9A78E}" type="datetime1">
               <a:rPr lang="en-GB" smtClean="0"/>
-              <a:t>02/04/2024</a:t>
+              <a:t>03/04/2024</a:t>
             </a:fld>
             <a:endParaRPr lang="en-GB"/>
           </a:p>
@@ -2571,7 +2656,7 @@
           <a:p>
             <a:fld id="{CA1DA76A-A919-473D-B354-18365EADF2F5}" type="datetime1">
               <a:rPr lang="en-GB" smtClean="0"/>
-              <a:t>02/04/2024</a:t>
+              <a:t>03/04/2024</a:t>
             </a:fld>
             <a:endParaRPr lang="en-GB"/>
           </a:p>
@@ -2842,7 +2927,7 @@
           <a:p>
             <a:fld id="{E51BBD68-46CA-4165-816E-CD8C056875FC}" type="datetime1">
               <a:rPr lang="en-GB" smtClean="0"/>
-              <a:t>02/04/2024</a:t>
+              <a:t>03/04/2024</a:t>
             </a:fld>
             <a:endParaRPr lang="en-GB"/>
           </a:p>
@@ -3260,7 +3345,7 @@
           <a:p>
             <a:fld id="{B2FAE00B-F786-4A05-8A94-4E14BC77E290}" type="datetime1">
               <a:rPr lang="en-GB" smtClean="0"/>
-              <a:t>02/04/2024</a:t>
+              <a:t>03/04/2024</a:t>
             </a:fld>
             <a:endParaRPr lang="en-GB"/>
           </a:p>
@@ -3405,7 +3490,7 @@
           <a:p>
             <a:fld id="{2017125D-372F-403A-BE3C-7D72C6C3FDF5}" type="datetime1">
               <a:rPr lang="en-GB" smtClean="0"/>
-              <a:t>02/04/2024</a:t>
+              <a:t>03/04/2024</a:t>
             </a:fld>
             <a:endParaRPr lang="en-GB"/>
           </a:p>
@@ -3521,7 +3606,7 @@
           <a:p>
             <a:fld id="{220398F7-D689-461D-B713-9ACC4E34E2F6}" type="datetime1">
               <a:rPr lang="en-GB" smtClean="0"/>
-              <a:t>02/04/2024</a:t>
+              <a:t>03/04/2024</a:t>
             </a:fld>
             <a:endParaRPr lang="en-GB"/>
           </a:p>
@@ -3837,7 +3922,7 @@
           <a:p>
             <a:fld id="{043CA75F-4FC6-4A09-B610-681E3F3B6E7D}" type="datetime1">
               <a:rPr lang="en-GB" smtClean="0"/>
-              <a:t>02/04/2024</a:t>
+              <a:t>03/04/2024</a:t>
             </a:fld>
             <a:endParaRPr lang="en-GB"/>
           </a:p>
@@ -4129,7 +4214,7 @@
           <a:p>
             <a:fld id="{4F9D3380-6300-4980-85F1-73CEABF7B00C}" type="datetime1">
               <a:rPr lang="en-GB" smtClean="0"/>
-              <a:t>02/04/2024</a:t>
+              <a:t>03/04/2024</a:t>
             </a:fld>
             <a:endParaRPr lang="en-GB"/>
           </a:p>
@@ -4375,7 +4460,7 @@
           <a:p>
             <a:fld id="{115F3E82-D6CD-4F98-8A25-92742025E9CB}" type="datetime1">
               <a:rPr lang="en-GB" smtClean="0"/>
-              <a:t>02/04/2024</a:t>
+              <a:t>03/04/2024</a:t>
             </a:fld>
             <a:endParaRPr lang="en-GB"/>
           </a:p>
@@ -4886,8 +4971,8 @@
         </p:nvSpPr>
         <p:spPr>
           <a:xfrm>
-            <a:off x="495300" y="5753100"/>
-            <a:ext cx="3784600" cy="923330"/>
+            <a:off x="469900" y="5582979"/>
+            <a:ext cx="3784600" cy="1200329"/>
           </a:xfrm>
           <a:prstGeom prst="rect">
             <a:avLst/>
@@ -4903,6 +4988,13 @@
             <a:r>
               <a:rPr lang="en-GB" dirty="0"/>
               <a:t>Dani Gargya</a:t>
+            </a:r>
+            <a:br>
+              <a:rPr lang="en-GB" dirty="0"/>
+            </a:br>
+            <a:r>
+              <a:rPr lang="en-GB" dirty="0"/>
+              <a:t>daniela@gargya.de</a:t>
             </a:r>
           </a:p>
           <a:p>
@@ -5050,12 +5142,7 @@
             <p:ph type="title"/>
           </p:nvPr>
         </p:nvSpPr>
-        <p:spPr>
-          <a:xfrm>
-            <a:off x="153165" y="501013"/>
-            <a:ext cx="10515600" cy="1325563"/>
-          </a:xfrm>
-        </p:spPr>
+        <p:spPr/>
         <p:txBody>
           <a:bodyPr/>
           <a:lstStyle/>
@@ -5070,6 +5157,34 @@
             <a:r>
               <a:rPr lang="en-GB" dirty="0"/>
               <a:t>Surveys</a:t>
+            </a:r>
+          </a:p>
+        </p:txBody>
+      </p:sp>
+      <p:sp>
+        <p:nvSpPr>
+          <p:cNvPr id="4" name="Footer Placeholder 3">
+            <a:extLst>
+              <a:ext uri="{FF2B5EF4-FFF2-40B4-BE49-F238E27FC236}">
+                <a16:creationId xmlns:a16="http://schemas.microsoft.com/office/drawing/2014/main" id="{101A3F43-341D-3AF1-CF7A-A6C17DB6FD41}"/>
+              </a:ext>
+            </a:extLst>
+          </p:cNvPr>
+          <p:cNvSpPr>
+            <a:spLocks noGrp="1"/>
+          </p:cNvSpPr>
+          <p:nvPr>
+            <p:ph type="ftr" sz="quarter" idx="11"/>
+          </p:nvPr>
+        </p:nvSpPr>
+        <p:spPr/>
+        <p:txBody>
+          <a:bodyPr/>
+          <a:lstStyle/>
+          <a:p>
+            <a:r>
+              <a:rPr lang="en-GB"/>
+              <a:t>Self-efficacy beliefs and participatory SDE || Dani Gargya || 06.03.24</a:t>
             </a:r>
           </a:p>
         </p:txBody>
@@ -5121,42 +5236,93 @@
           </a:extLst>
         </p:spPr>
       </p:pic>
-      <p:pic>
-        <p:nvPicPr>
-          <p:cNvPr id="7" name="Picture 6">
-            <a:extLst>
-              <a:ext uri="{FF2B5EF4-FFF2-40B4-BE49-F238E27FC236}">
-                <a16:creationId xmlns:a16="http://schemas.microsoft.com/office/drawing/2014/main" id="{043568F6-9AB2-E4E0-D511-6A680C83AB50}"/>
-              </a:ext>
-            </a:extLst>
-          </p:cNvPr>
-          <p:cNvPicPr>
-            <a:picLocks noChangeAspect="1"/>
-          </p:cNvPicPr>
+      <p:grpSp>
+        <p:nvGrpSpPr>
+          <p:cNvPr id="10" name="Group 9">
+            <a:extLst>
+              <a:ext uri="{FF2B5EF4-FFF2-40B4-BE49-F238E27FC236}">
+                <a16:creationId xmlns:a16="http://schemas.microsoft.com/office/drawing/2014/main" id="{D1586986-0D81-D4CC-75E7-8B1B45C0E99B}"/>
+              </a:ext>
+            </a:extLst>
+          </p:cNvPr>
+          <p:cNvGrpSpPr/>
           <p:nvPr/>
-        </p:nvPicPr>
-        <p:blipFill>
-          <a:blip r:embed="rId3"/>
-          <a:stretch>
-            <a:fillRect/>
-          </a:stretch>
-        </p:blipFill>
-        <p:spPr>
-          <a:xfrm>
-            <a:off x="2814237" y="488814"/>
-            <a:ext cx="7371164" cy="6004061"/>
-          </a:xfrm>
-          <a:prstGeom prst="rect">
-            <a:avLst/>
-          </a:prstGeom>
-        </p:spPr>
-      </p:pic>
-      <p:sp>
-        <p:nvSpPr>
-          <p:cNvPr id="8" name="TextBox 7">
-            <a:extLst>
-              <a:ext uri="{FF2B5EF4-FFF2-40B4-BE49-F238E27FC236}">
-                <a16:creationId xmlns:a16="http://schemas.microsoft.com/office/drawing/2014/main" id="{B247CFF8-4FCD-E544-F1F4-17FD9BFD1D89}"/>
+        </p:nvGrpSpPr>
+        <p:grpSpPr>
+          <a:xfrm>
+            <a:off x="3913900" y="136525"/>
+            <a:ext cx="4114801" cy="6180716"/>
+            <a:chOff x="3752729" y="136525"/>
+            <a:chExt cx="4686541" cy="6928207"/>
+          </a:xfrm>
+        </p:grpSpPr>
+        <p:pic>
+          <p:nvPicPr>
+            <p:cNvPr id="6" name="Picture 5">
+              <a:extLst>
+                <a:ext uri="{FF2B5EF4-FFF2-40B4-BE49-F238E27FC236}">
+                  <a16:creationId xmlns:a16="http://schemas.microsoft.com/office/drawing/2014/main" id="{22AC2898-02F7-9122-A6BE-9096975A3917}"/>
+                </a:ext>
+              </a:extLst>
+            </p:cNvPr>
+            <p:cNvPicPr>
+              <a:picLocks noChangeAspect="1"/>
+            </p:cNvPicPr>
+            <p:nvPr/>
+          </p:nvPicPr>
+          <p:blipFill>
+            <a:blip r:embed="rId3"/>
+            <a:stretch>
+              <a:fillRect/>
+            </a:stretch>
+          </p:blipFill>
+          <p:spPr>
+            <a:xfrm>
+              <a:off x="3752729" y="136525"/>
+              <a:ext cx="4686541" cy="4210266"/>
+            </a:xfrm>
+            <a:prstGeom prst="rect">
+              <a:avLst/>
+            </a:prstGeom>
+          </p:spPr>
+        </p:pic>
+        <p:pic>
+          <p:nvPicPr>
+            <p:cNvPr id="9" name="Picture 8">
+              <a:extLst>
+                <a:ext uri="{FF2B5EF4-FFF2-40B4-BE49-F238E27FC236}">
+                  <a16:creationId xmlns:a16="http://schemas.microsoft.com/office/drawing/2014/main" id="{28A507F9-5F72-0559-AE6B-D8F1E0DE3A65}"/>
+                </a:ext>
+              </a:extLst>
+            </p:cNvPr>
+            <p:cNvPicPr>
+              <a:picLocks noChangeAspect="1"/>
+            </p:cNvPicPr>
+            <p:nvPr/>
+          </p:nvPicPr>
+          <p:blipFill>
+            <a:blip r:embed="rId4"/>
+            <a:stretch>
+              <a:fillRect/>
+            </a:stretch>
+          </p:blipFill>
+          <p:spPr>
+            <a:xfrm>
+              <a:off x="3752729" y="4315041"/>
+              <a:ext cx="4673840" cy="2749691"/>
+            </a:xfrm>
+            <a:prstGeom prst="rect">
+              <a:avLst/>
+            </a:prstGeom>
+          </p:spPr>
+        </p:pic>
+      </p:grpSp>
+      <p:sp>
+        <p:nvSpPr>
+          <p:cNvPr id="11" name="TextBox 10">
+            <a:extLst>
+              <a:ext uri="{FF2B5EF4-FFF2-40B4-BE49-F238E27FC236}">
+                <a16:creationId xmlns:a16="http://schemas.microsoft.com/office/drawing/2014/main" id="{D2D6C47A-F1FD-3AEC-5A76-B262080039F9}"/>
               </a:ext>
             </a:extLst>
           </p:cNvPr>
@@ -5165,8 +5331,8 @@
         </p:nvSpPr>
         <p:spPr>
           <a:xfrm>
-            <a:off x="249437" y="2166938"/>
-            <a:ext cx="2702309" cy="646331"/>
+            <a:off x="838200" y="2166938"/>
+            <a:ext cx="2468526" cy="923330"/>
           </a:xfrm>
           <a:prstGeom prst="rect">
             <a:avLst/>
@@ -5181,47 +5347,14 @@
           <a:p>
             <a:r>
               <a:rPr lang="en-GB" dirty="0"/>
-              <a:t>Self efficacy beliefs– </a:t>
+              <a:t>Sustainability attitudes and behaviour – </a:t>
             </a:r>
             <a:br>
               <a:rPr lang="en-GB" dirty="0"/>
             </a:br>
             <a:r>
               <a:rPr lang="en-GB" dirty="0"/>
-              <a:t>based on Hamann et al.</a:t>
-            </a:r>
-          </a:p>
-        </p:txBody>
-      </p:sp>
-      <p:sp>
-        <p:nvSpPr>
-          <p:cNvPr id="3" name="Footer Placeholder 3">
-            <a:extLst>
-              <a:ext uri="{FF2B5EF4-FFF2-40B4-BE49-F238E27FC236}">
-                <a16:creationId xmlns:a16="http://schemas.microsoft.com/office/drawing/2014/main" id="{D1C711D2-DD87-5772-EA21-A2EBFB781D8A}"/>
-              </a:ext>
-            </a:extLst>
-          </p:cNvPr>
-          <p:cNvSpPr>
-            <a:spLocks noGrp="1"/>
-          </p:cNvSpPr>
-          <p:nvPr>
-            <p:ph type="ftr" sz="quarter" idx="11"/>
-          </p:nvPr>
-        </p:nvSpPr>
-        <p:spPr>
-          <a:xfrm>
-            <a:off x="4061419" y="6492875"/>
-            <a:ext cx="4876800" cy="260350"/>
-          </a:xfrm>
-        </p:spPr>
-        <p:txBody>
-          <a:bodyPr/>
-          <a:lstStyle/>
-          <a:p>
-            <a:r>
-              <a:rPr lang="en-GB" dirty="0"/>
-              <a:t>Sustainability competences and participatory ESD || Dani Gargya || 03.04.24</a:t>
+              <a:t>based on MA Lisa Pauli</a:t>
             </a:r>
           </a:p>
         </p:txBody>
@@ -5229,7 +5362,7 @@
     </p:spTree>
     <p:extLst>
       <p:ext uri="{BB962C8B-B14F-4D97-AF65-F5344CB8AC3E}">
-        <p14:creationId xmlns:p14="http://schemas.microsoft.com/office/powerpoint/2010/main" val="1933737024"/>
+        <p14:creationId xmlns:p14="http://schemas.microsoft.com/office/powerpoint/2010/main" val="3992079478"/>
       </p:ext>
     </p:extLst>
   </p:cSld>
@@ -5261,7 +5394,7 @@
           <p:cNvPr id="2" name="Title 1">
             <a:extLst>
               <a:ext uri="{FF2B5EF4-FFF2-40B4-BE49-F238E27FC236}">
-                <a16:creationId xmlns:a16="http://schemas.microsoft.com/office/drawing/2014/main" id="{E4E3FC2E-1A81-FA6E-A77E-023C8359152B}"/>
+                <a16:creationId xmlns:a16="http://schemas.microsoft.com/office/drawing/2014/main" id="{49939984-9A30-344A-0C72-F25E4D90D72D}"/>
               </a:ext>
             </a:extLst>
           </p:cNvPr>
@@ -5272,68 +5405,26 @@
             <p:ph type="title"/>
           </p:nvPr>
         </p:nvSpPr>
-        <p:spPr/>
+        <p:spPr>
+          <a:xfrm>
+            <a:off x="153165" y="501013"/>
+            <a:ext cx="10515600" cy="1325563"/>
+          </a:xfrm>
+        </p:spPr>
         <p:txBody>
           <a:bodyPr/>
           <a:lstStyle/>
           <a:p>
             <a:r>
               <a:rPr lang="en-GB" dirty="0"/>
-              <a:t>Methods – Data analysis</a:t>
-            </a:r>
-          </a:p>
-        </p:txBody>
-      </p:sp>
-      <p:sp>
-        <p:nvSpPr>
-          <p:cNvPr id="3" name="Content Placeholder 2">
-            <a:extLst>
-              <a:ext uri="{FF2B5EF4-FFF2-40B4-BE49-F238E27FC236}">
-                <a16:creationId xmlns:a16="http://schemas.microsoft.com/office/drawing/2014/main" id="{766A6974-1347-993F-A7F4-71482EAAD8E4}"/>
-              </a:ext>
-            </a:extLst>
-          </p:cNvPr>
-          <p:cNvSpPr>
-            <a:spLocks noGrp="1"/>
-          </p:cNvSpPr>
-          <p:nvPr>
-            <p:ph idx="1"/>
-          </p:nvPr>
-        </p:nvSpPr>
-        <p:spPr>
-          <a:xfrm>
-            <a:off x="838200" y="1602341"/>
-            <a:ext cx="10515600" cy="4351338"/>
-          </a:xfrm>
-        </p:spPr>
-        <p:txBody>
-          <a:bodyPr/>
-          <a:lstStyle/>
-          <a:p>
-            <a:pPr marL="0" indent="0">
-              <a:buNone/>
-            </a:pPr>
-            <a:endParaRPr lang="en-GB" dirty="0"/>
-          </a:p>
-          <a:p>
-            <a:pPr marL="0" indent="0">
-              <a:buNone/>
-            </a:pPr>
-            <a:endParaRPr lang="en-GB" dirty="0"/>
-          </a:p>
-          <a:p>
-            <a:pPr marL="0" indent="0">
-              <a:buNone/>
-            </a:pPr>
-            <a:endParaRPr lang="en-GB" dirty="0"/>
-          </a:p>
-          <a:p>
-            <a:pPr marL="0" indent="0">
-              <a:buNone/>
-            </a:pPr>
-            <a:r>
+              <a:t>Methods – </a:t>
+            </a:r>
+            <a:br>
               <a:rPr lang="en-GB" dirty="0"/>
-              <a:t>Climate attitude/ climate behaviour/ Self-efficacy ~ duration + level of involvement + (1|school) + </a:t>
+            </a:br>
+            <a:r>
+              <a:rPr lang="en-GB" dirty="0"/>
+              <a:t>Surveys</a:t>
             </a:r>
           </a:p>
         </p:txBody>
@@ -5343,7 +5434,7 @@
           <p:cNvPr id="5" name="Picture 2">
             <a:extLst>
               <a:ext uri="{FF2B5EF4-FFF2-40B4-BE49-F238E27FC236}">
-                <a16:creationId xmlns:a16="http://schemas.microsoft.com/office/drawing/2014/main" id="{92C5F10B-91EE-CEF0-ADAD-862ABAEC1089}"/>
+                <a16:creationId xmlns:a16="http://schemas.microsoft.com/office/drawing/2014/main" id="{178A05FA-0832-DCD6-F94B-0B0EF287E97A}"/>
               </a:ext>
             </a:extLst>
           </p:cNvPr>
@@ -5367,7 +5458,7 @@
         </p:blipFill>
         <p:spPr bwMode="auto">
           <a:xfrm>
-            <a:off x="10185401" y="25400"/>
+            <a:off x="10185401" y="0"/>
             <a:ext cx="1853434" cy="2166938"/>
           </a:xfrm>
           <a:prstGeom prst="rect">
@@ -5385,12 +5476,84 @@
           </a:extLst>
         </p:spPr>
       </p:pic>
-      <p:sp>
-        <p:nvSpPr>
-          <p:cNvPr id="6" name="Footer Placeholder 3">
-            <a:extLst>
-              <a:ext uri="{FF2B5EF4-FFF2-40B4-BE49-F238E27FC236}">
-                <a16:creationId xmlns:a16="http://schemas.microsoft.com/office/drawing/2014/main" id="{B8A353CE-8E76-83AA-DA09-FEAD9F196D18}"/>
+      <p:pic>
+        <p:nvPicPr>
+          <p:cNvPr id="7" name="Picture 6">
+            <a:extLst>
+              <a:ext uri="{FF2B5EF4-FFF2-40B4-BE49-F238E27FC236}">
+                <a16:creationId xmlns:a16="http://schemas.microsoft.com/office/drawing/2014/main" id="{043568F6-9AB2-E4E0-D511-6A680C83AB50}"/>
+              </a:ext>
+            </a:extLst>
+          </p:cNvPr>
+          <p:cNvPicPr>
+            <a:picLocks noChangeAspect="1"/>
+          </p:cNvPicPr>
+          <p:nvPr/>
+        </p:nvPicPr>
+        <p:blipFill>
+          <a:blip r:embed="rId3"/>
+          <a:stretch>
+            <a:fillRect/>
+          </a:stretch>
+        </p:blipFill>
+        <p:spPr>
+          <a:xfrm>
+            <a:off x="2814237" y="488814"/>
+            <a:ext cx="7371164" cy="6004061"/>
+          </a:xfrm>
+          <a:prstGeom prst="rect">
+            <a:avLst/>
+          </a:prstGeom>
+        </p:spPr>
+      </p:pic>
+      <p:sp>
+        <p:nvSpPr>
+          <p:cNvPr id="8" name="TextBox 7">
+            <a:extLst>
+              <a:ext uri="{FF2B5EF4-FFF2-40B4-BE49-F238E27FC236}">
+                <a16:creationId xmlns:a16="http://schemas.microsoft.com/office/drawing/2014/main" id="{B247CFF8-4FCD-E544-F1F4-17FD9BFD1D89}"/>
+              </a:ext>
+            </a:extLst>
+          </p:cNvPr>
+          <p:cNvSpPr txBox="1"/>
+          <p:nvPr/>
+        </p:nvSpPr>
+        <p:spPr>
+          <a:xfrm>
+            <a:off x="249437" y="2166938"/>
+            <a:ext cx="2702309" cy="646331"/>
+          </a:xfrm>
+          <a:prstGeom prst="rect">
+            <a:avLst/>
+          </a:prstGeom>
+          <a:noFill/>
+        </p:spPr>
+        <p:txBody>
+          <a:bodyPr wrap="square" rtlCol="0">
+            <a:spAutoFit/>
+          </a:bodyPr>
+          <a:lstStyle/>
+          <a:p>
+            <a:r>
+              <a:rPr lang="en-GB" dirty="0"/>
+              <a:t>Self efficacy beliefs– </a:t>
+            </a:r>
+            <a:br>
+              <a:rPr lang="en-GB" dirty="0"/>
+            </a:br>
+            <a:r>
+              <a:rPr lang="en-GB" dirty="0"/>
+              <a:t>based on Hamann et al.</a:t>
+            </a:r>
+          </a:p>
+        </p:txBody>
+      </p:sp>
+      <p:sp>
+        <p:nvSpPr>
+          <p:cNvPr id="3" name="Footer Placeholder 3">
+            <a:extLst>
+              <a:ext uri="{FF2B5EF4-FFF2-40B4-BE49-F238E27FC236}">
+                <a16:creationId xmlns:a16="http://schemas.microsoft.com/office/drawing/2014/main" id="{D1C711D2-DD87-5772-EA21-A2EBFB781D8A}"/>
               </a:ext>
             </a:extLst>
           </p:cNvPr>
@@ -5403,7 +5566,7 @@
         </p:nvSpPr>
         <p:spPr>
           <a:xfrm>
-            <a:off x="4038600" y="6356351"/>
+            <a:off x="4061419" y="6492875"/>
             <a:ext cx="4876800" cy="260350"/>
           </a:xfrm>
         </p:spPr>
@@ -5421,7 +5584,7 @@
     </p:spTree>
     <p:extLst>
       <p:ext uri="{BB962C8B-B14F-4D97-AF65-F5344CB8AC3E}">
-        <p14:creationId xmlns:p14="http://schemas.microsoft.com/office/powerpoint/2010/main" val="1832674324"/>
+        <p14:creationId xmlns:p14="http://schemas.microsoft.com/office/powerpoint/2010/main" val="1933737024"/>
       </p:ext>
     </p:extLst>
   </p:cSld>
@@ -5453,7 +5616,7 @@
           <p:cNvPr id="2" name="Title 1">
             <a:extLst>
               <a:ext uri="{FF2B5EF4-FFF2-40B4-BE49-F238E27FC236}">
-                <a16:creationId xmlns:a16="http://schemas.microsoft.com/office/drawing/2014/main" id="{727BB447-61EC-19F1-E223-37EBCF567169}"/>
+                <a16:creationId xmlns:a16="http://schemas.microsoft.com/office/drawing/2014/main" id="{E4E3FC2E-1A81-FA6E-A77E-023C8359152B}"/>
               </a:ext>
             </a:extLst>
           </p:cNvPr>
@@ -5471,43 +5634,17 @@
           <a:p>
             <a:r>
               <a:rPr lang="en-GB" dirty="0"/>
-              <a:t>Proposed timetable</a:t>
-            </a:r>
-          </a:p>
-        </p:txBody>
-      </p:sp>
-      <p:graphicFrame>
-        <p:nvGraphicFramePr>
-          <p:cNvPr id="10" name="Content Placeholder 9">
-            <a:extLst>
-              <a:ext uri="{FF2B5EF4-FFF2-40B4-BE49-F238E27FC236}">
-                <a16:creationId xmlns:a16="http://schemas.microsoft.com/office/drawing/2014/main" id="{499DD802-5E6E-453F-B971-C1ADFE1D7E63}"/>
-              </a:ext>
-            </a:extLst>
-          </p:cNvPr>
-          <p:cNvGraphicFramePr>
-            <a:graphicFrameLocks noGrp="1"/>
-          </p:cNvGraphicFramePr>
-          <p:nvPr>
-            <p:ph idx="1"/>
-          </p:nvPr>
-        </p:nvGraphicFramePr>
-        <p:xfrm>
-          <a:off x="838200" y="1825625"/>
-          <a:ext cx="10515600" cy="4351338"/>
-        </p:xfrm>
-        <a:graphic>
-          <a:graphicData uri="http://schemas.openxmlformats.org/drawingml/2006/chart">
-            <c:chart xmlns:c="http://schemas.openxmlformats.org/drawingml/2006/chart" xmlns:r="http://schemas.openxmlformats.org/officeDocument/2006/relationships" r:id="rId2"/>
-          </a:graphicData>
-        </a:graphic>
-      </p:graphicFrame>
-      <p:sp>
-        <p:nvSpPr>
-          <p:cNvPr id="11" name="Footer Placeholder 3">
-            <a:extLst>
-              <a:ext uri="{FF2B5EF4-FFF2-40B4-BE49-F238E27FC236}">
-                <a16:creationId xmlns:a16="http://schemas.microsoft.com/office/drawing/2014/main" id="{7D1A9BB8-D4A0-CB77-64BF-2B0B41ADCEA7}"/>
+              <a:t>Methods – Data analysis</a:t>
+            </a:r>
+          </a:p>
+        </p:txBody>
+      </p:sp>
+      <p:sp>
+        <p:nvSpPr>
+          <p:cNvPr id="3" name="Content Placeholder 2">
+            <a:extLst>
+              <a:ext uri="{FF2B5EF4-FFF2-40B4-BE49-F238E27FC236}">
+                <a16:creationId xmlns:a16="http://schemas.microsoft.com/office/drawing/2014/main" id="{766A6974-1347-993F-A7F4-71482EAAD8E4}"/>
               </a:ext>
             </a:extLst>
           </p:cNvPr>
@@ -5515,32 +5652,53 @@
             <a:spLocks noGrp="1"/>
           </p:cNvSpPr>
           <p:nvPr>
-            <p:ph type="ftr" sz="quarter" idx="11"/>
+            <p:ph idx="1"/>
           </p:nvPr>
         </p:nvSpPr>
         <p:spPr>
           <a:xfrm>
-            <a:off x="4038600" y="6356351"/>
-            <a:ext cx="4876800" cy="260350"/>
+            <a:off x="838200" y="1602341"/>
+            <a:ext cx="10515600" cy="4351338"/>
           </a:xfrm>
         </p:spPr>
         <p:txBody>
           <a:bodyPr/>
           <a:lstStyle/>
           <a:p>
+            <a:pPr marL="0" indent="0">
+              <a:buNone/>
+            </a:pPr>
+            <a:endParaRPr lang="en-GB" dirty="0"/>
+          </a:p>
+          <a:p>
+            <a:pPr marL="0" indent="0">
+              <a:buNone/>
+            </a:pPr>
+            <a:endParaRPr lang="en-GB" dirty="0"/>
+          </a:p>
+          <a:p>
+            <a:pPr marL="0" indent="0">
+              <a:buNone/>
+            </a:pPr>
+            <a:endParaRPr lang="en-GB" dirty="0"/>
+          </a:p>
+          <a:p>
+            <a:pPr marL="0" indent="0">
+              <a:buNone/>
+            </a:pPr>
             <a:r>
               <a:rPr lang="en-GB" dirty="0"/>
-              <a:t>Sustainability competences and participatory ESD || Dani Gargya || 03.04.24</a:t>
+              <a:t>Climate attitude/ climate behaviour/ Self-efficacy ~ duration + level of involvement + (1|school) + </a:t>
             </a:r>
           </a:p>
         </p:txBody>
       </p:sp>
       <p:pic>
         <p:nvPicPr>
-          <p:cNvPr id="12" name="Picture 2">
-            <a:extLst>
-              <a:ext uri="{FF2B5EF4-FFF2-40B4-BE49-F238E27FC236}">
-                <a16:creationId xmlns:a16="http://schemas.microsoft.com/office/drawing/2014/main" id="{924F83FF-430F-5D66-F7A9-76BDA1051F49}"/>
+          <p:cNvPr id="5" name="Picture 2">
+            <a:extLst>
+              <a:ext uri="{FF2B5EF4-FFF2-40B4-BE49-F238E27FC236}">
+                <a16:creationId xmlns:a16="http://schemas.microsoft.com/office/drawing/2014/main" id="{92C5F10B-91EE-CEF0-ADAD-862ABAEC1089}"/>
               </a:ext>
             </a:extLst>
           </p:cNvPr>
@@ -5550,7 +5708,7 @@
           <p:nvPr/>
         </p:nvPicPr>
         <p:blipFill>
-          <a:blip r:embed="rId3">
+          <a:blip r:embed="rId2">
             <a:extLst>
               <a:ext uri="{28A0092B-C50C-407E-A947-70E740481C1C}">
                 <a14:useLocalDpi xmlns:a14="http://schemas.microsoft.com/office/drawing/2010/main" val="0"/>
@@ -5584,43 +5742,33 @@
       </p:pic>
       <p:sp>
         <p:nvSpPr>
-          <p:cNvPr id="3" name="TextBox 2">
-            <a:extLst>
-              <a:ext uri="{FF2B5EF4-FFF2-40B4-BE49-F238E27FC236}">
-                <a16:creationId xmlns:a16="http://schemas.microsoft.com/office/drawing/2014/main" id="{9C551539-E3CD-8765-B773-06638B754A24}"/>
-              </a:ext>
-            </a:extLst>
-          </p:cNvPr>
-          <p:cNvSpPr txBox="1"/>
-          <p:nvPr/>
+          <p:cNvPr id="6" name="Footer Placeholder 3">
+            <a:extLst>
+              <a:ext uri="{FF2B5EF4-FFF2-40B4-BE49-F238E27FC236}">
+                <a16:creationId xmlns:a16="http://schemas.microsoft.com/office/drawing/2014/main" id="{B8A353CE-8E76-83AA-DA09-FEAD9F196D18}"/>
+              </a:ext>
+            </a:extLst>
+          </p:cNvPr>
+          <p:cNvSpPr>
+            <a:spLocks noGrp="1"/>
+          </p:cNvSpPr>
+          <p:nvPr>
+            <p:ph type="ftr" sz="quarter" idx="11"/>
+          </p:nvPr>
         </p:nvSpPr>
         <p:spPr>
           <a:xfrm>
-            <a:off x="885872" y="1468658"/>
-            <a:ext cx="2594344" cy="369332"/>
-          </a:xfrm>
-          <a:prstGeom prst="rect">
-            <a:avLst/>
-          </a:prstGeom>
-          <a:noFill/>
-        </p:spPr>
-        <p:txBody>
-          <a:bodyPr wrap="square" rtlCol="0">
-            <a:spAutoFit/>
-          </a:bodyPr>
+            <a:off x="4038600" y="6356351"/>
+            <a:ext cx="4876800" cy="260350"/>
+          </a:xfrm>
+        </p:spPr>
+        <p:txBody>
+          <a:bodyPr/>
           <a:lstStyle/>
           <a:p>
             <a:r>
-              <a:rPr lang="en-GB" b="1" dirty="0"/>
-              <a:t>Hand-in: 31</a:t>
-            </a:r>
-            <a:r>
-              <a:rPr lang="en-GB" b="1" baseline="30000" dirty="0"/>
-              <a:t>st</a:t>
-            </a:r>
-            <a:r>
-              <a:rPr lang="en-GB" b="1" dirty="0"/>
-              <a:t> July!</a:t>
+              <a:rPr lang="en-GB" dirty="0"/>
+              <a:t>Sustainability competences and participatory ESD || Dani Gargya || 03.04.24</a:t>
             </a:r>
           </a:p>
         </p:txBody>
@@ -5628,7 +5776,7 @@
     </p:spTree>
     <p:extLst>
       <p:ext uri="{BB962C8B-B14F-4D97-AF65-F5344CB8AC3E}">
-        <p14:creationId xmlns:p14="http://schemas.microsoft.com/office/powerpoint/2010/main" val="961804955"/>
+        <p14:creationId xmlns:p14="http://schemas.microsoft.com/office/powerpoint/2010/main" val="1832674324"/>
       </p:ext>
     </p:extLst>
   </p:cSld>
@@ -5660,7 +5808,7 @@
           <p:cNvPr id="2" name="Title 1">
             <a:extLst>
               <a:ext uri="{FF2B5EF4-FFF2-40B4-BE49-F238E27FC236}">
-                <a16:creationId xmlns:a16="http://schemas.microsoft.com/office/drawing/2014/main" id="{79FD9D75-F62B-25F5-E469-751537A4CF78}"/>
+                <a16:creationId xmlns:a16="http://schemas.microsoft.com/office/drawing/2014/main" id="{727BB447-61EC-19F1-E223-37EBCF567169}"/>
               </a:ext>
             </a:extLst>
           </p:cNvPr>
@@ -5678,69 +5826,43 @@
           <a:p>
             <a:r>
               <a:rPr lang="en-GB" dirty="0"/>
-              <a:t>Next steps</a:t>
-            </a:r>
-          </a:p>
-        </p:txBody>
-      </p:sp>
-      <p:sp>
-        <p:nvSpPr>
-          <p:cNvPr id="3" name="Content Placeholder 2">
-            <a:extLst>
-              <a:ext uri="{FF2B5EF4-FFF2-40B4-BE49-F238E27FC236}">
-                <a16:creationId xmlns:a16="http://schemas.microsoft.com/office/drawing/2014/main" id="{0E336A5E-B3F2-6D02-2989-32EA44715CFC}"/>
-              </a:ext>
-            </a:extLst>
-          </p:cNvPr>
-          <p:cNvSpPr>
-            <a:spLocks noGrp="1"/>
-          </p:cNvSpPr>
+              <a:t>Proposed timetable</a:t>
+            </a:r>
+          </a:p>
+        </p:txBody>
+      </p:sp>
+      <p:graphicFrame>
+        <p:nvGraphicFramePr>
+          <p:cNvPr id="10" name="Content Placeholder 9">
+            <a:extLst>
+              <a:ext uri="{FF2B5EF4-FFF2-40B4-BE49-F238E27FC236}">
+                <a16:creationId xmlns:a16="http://schemas.microsoft.com/office/drawing/2014/main" id="{499DD802-5E6E-453F-B971-C1ADFE1D7E63}"/>
+              </a:ext>
+            </a:extLst>
+          </p:cNvPr>
+          <p:cNvGraphicFramePr>
+            <a:graphicFrameLocks noGrp="1"/>
+          </p:cNvGraphicFramePr>
           <p:nvPr>
             <p:ph idx="1"/>
           </p:nvPr>
-        </p:nvSpPr>
-        <p:spPr/>
-        <p:txBody>
-          <a:bodyPr/>
-          <a:lstStyle/>
-          <a:p>
-            <a:r>
-              <a:rPr lang="en-GB" dirty="0"/>
-              <a:t>Confirmation/additions research focus from Solare Zukunft/ IZT</a:t>
-            </a:r>
-          </a:p>
-          <a:p>
-            <a:r>
-              <a:rPr lang="en-GB" dirty="0"/>
-              <a:t>Contact with schools and data collection</a:t>
-            </a:r>
-          </a:p>
-          <a:p>
-            <a:r>
-              <a:rPr lang="en-GB" dirty="0"/>
-              <a:t>Contact existing data Lisa Pauli for analysis</a:t>
-            </a:r>
-          </a:p>
-          <a:p>
-            <a:endParaRPr lang="en-GB" dirty="0"/>
-          </a:p>
-          <a:p>
-            <a:endParaRPr lang="en-GB" dirty="0"/>
-          </a:p>
-          <a:p>
-            <a:r>
-              <a:rPr lang="en-GB" dirty="0"/>
-              <a:t>Official registration</a:t>
-            </a:r>
-          </a:p>
-        </p:txBody>
-      </p:sp>
-      <p:sp>
-        <p:nvSpPr>
-          <p:cNvPr id="5" name="Footer Placeholder 3">
-            <a:extLst>
-              <a:ext uri="{FF2B5EF4-FFF2-40B4-BE49-F238E27FC236}">
-                <a16:creationId xmlns:a16="http://schemas.microsoft.com/office/drawing/2014/main" id="{312E21E9-C0D9-E5CB-9748-AD3140FF9E26}"/>
+        </p:nvGraphicFramePr>
+        <p:xfrm>
+          <a:off x="838200" y="1825625"/>
+          <a:ext cx="10515600" cy="4351338"/>
+        </p:xfrm>
+        <a:graphic>
+          <a:graphicData uri="http://schemas.openxmlformats.org/drawingml/2006/chart">
+            <c:chart xmlns:c="http://schemas.openxmlformats.org/drawingml/2006/chart" xmlns:r="http://schemas.openxmlformats.org/officeDocument/2006/relationships" r:id="rId2"/>
+          </a:graphicData>
+        </a:graphic>
+      </p:graphicFrame>
+      <p:sp>
+        <p:nvSpPr>
+          <p:cNvPr id="11" name="Footer Placeholder 3">
+            <a:extLst>
+              <a:ext uri="{FF2B5EF4-FFF2-40B4-BE49-F238E27FC236}">
+                <a16:creationId xmlns:a16="http://schemas.microsoft.com/office/drawing/2014/main" id="{7D1A9BB8-D4A0-CB77-64BF-2B0B41ADCEA7}"/>
               </a:ext>
             </a:extLst>
           </p:cNvPr>
@@ -5768,10 +5890,100 @@
           </a:p>
         </p:txBody>
       </p:sp>
+      <p:pic>
+        <p:nvPicPr>
+          <p:cNvPr id="12" name="Picture 2">
+            <a:extLst>
+              <a:ext uri="{FF2B5EF4-FFF2-40B4-BE49-F238E27FC236}">
+                <a16:creationId xmlns:a16="http://schemas.microsoft.com/office/drawing/2014/main" id="{924F83FF-430F-5D66-F7A9-76BDA1051F49}"/>
+              </a:ext>
+            </a:extLst>
+          </p:cNvPr>
+          <p:cNvPicPr>
+            <a:picLocks noChangeAspect="1" noChangeArrowheads="1"/>
+          </p:cNvPicPr>
+          <p:nvPr/>
+        </p:nvPicPr>
+        <p:blipFill>
+          <a:blip r:embed="rId3">
+            <a:extLst>
+              <a:ext uri="{28A0092B-C50C-407E-A947-70E740481C1C}">
+                <a14:useLocalDpi xmlns:a14="http://schemas.microsoft.com/office/drawing/2010/main" val="0"/>
+              </a:ext>
+            </a:extLst>
+          </a:blip>
+          <a:srcRect/>
+          <a:stretch>
+            <a:fillRect/>
+          </a:stretch>
+        </p:blipFill>
+        <p:spPr bwMode="auto">
+          <a:xfrm>
+            <a:off x="10185401" y="25400"/>
+            <a:ext cx="1853434" cy="2166938"/>
+          </a:xfrm>
+          <a:prstGeom prst="rect">
+            <a:avLst/>
+          </a:prstGeom>
+          <a:noFill/>
+          <a:extLst>
+            <a:ext uri="{909E8E84-426E-40DD-AFC4-6F175D3DCCD1}">
+              <a14:hiddenFill xmlns:a14="http://schemas.microsoft.com/office/drawing/2010/main">
+                <a:solidFill>
+                  <a:srgbClr val="FFFFFF"/>
+                </a:solidFill>
+              </a14:hiddenFill>
+            </a:ext>
+          </a:extLst>
+        </p:spPr>
+      </p:pic>
+      <p:sp>
+        <p:nvSpPr>
+          <p:cNvPr id="3" name="TextBox 2">
+            <a:extLst>
+              <a:ext uri="{FF2B5EF4-FFF2-40B4-BE49-F238E27FC236}">
+                <a16:creationId xmlns:a16="http://schemas.microsoft.com/office/drawing/2014/main" id="{9C551539-E3CD-8765-B773-06638B754A24}"/>
+              </a:ext>
+            </a:extLst>
+          </p:cNvPr>
+          <p:cNvSpPr txBox="1"/>
+          <p:nvPr/>
+        </p:nvSpPr>
+        <p:spPr>
+          <a:xfrm>
+            <a:off x="885872" y="1468658"/>
+            <a:ext cx="2594344" cy="369332"/>
+          </a:xfrm>
+          <a:prstGeom prst="rect">
+            <a:avLst/>
+          </a:prstGeom>
+          <a:noFill/>
+        </p:spPr>
+        <p:txBody>
+          <a:bodyPr wrap="square" rtlCol="0">
+            <a:spAutoFit/>
+          </a:bodyPr>
+          <a:lstStyle/>
+          <a:p>
+            <a:r>
+              <a:rPr lang="en-GB" b="1" dirty="0"/>
+              <a:t>Hand-in: 31</a:t>
+            </a:r>
+            <a:r>
+              <a:rPr lang="en-GB" b="1" baseline="30000" dirty="0"/>
+              <a:t>st</a:t>
+            </a:r>
+            <a:r>
+              <a:rPr lang="en-GB" b="1" dirty="0"/>
+              <a:t> July!</a:t>
+            </a:r>
+          </a:p>
+        </p:txBody>
+      </p:sp>
     </p:spTree>
     <p:extLst>
       <p:ext uri="{BB962C8B-B14F-4D97-AF65-F5344CB8AC3E}">
-        <p14:creationId xmlns:p14="http://schemas.microsoft.com/office/powerpoint/2010/main" val="1382564575"/>
+        <p14:creationId xmlns:p14="http://schemas.microsoft.com/office/powerpoint/2010/main" val="961804955"/>
       </p:ext>
     </p:extLst>
   </p:cSld>
@@ -5803,7 +6015,7 @@
           <p:cNvPr id="2" name="Title 1">
             <a:extLst>
               <a:ext uri="{FF2B5EF4-FFF2-40B4-BE49-F238E27FC236}">
-                <a16:creationId xmlns:a16="http://schemas.microsoft.com/office/drawing/2014/main" id="{FA2F5305-6816-4A4E-FFD0-99F5ED9D4D43}"/>
+                <a16:creationId xmlns:a16="http://schemas.microsoft.com/office/drawing/2014/main" id="{79FD9D75-F62B-25F5-E469-751537A4CF78}"/>
               </a:ext>
             </a:extLst>
           </p:cNvPr>
@@ -5821,97 +6033,108 @@
           <a:p>
             <a:r>
               <a:rPr lang="en-GB" dirty="0"/>
-              <a:t>Questions and feedback</a:t>
-            </a:r>
-          </a:p>
-        </p:txBody>
-      </p:sp>
-      <p:pic>
-        <p:nvPicPr>
-          <p:cNvPr id="5" name="Content Placeholder 4" descr="Questions">
-            <a:extLst>
-              <a:ext uri="{FF2B5EF4-FFF2-40B4-BE49-F238E27FC236}">
-                <a16:creationId xmlns:a16="http://schemas.microsoft.com/office/drawing/2014/main" id="{6C22FE90-221C-866F-2C4A-E2D19BE009C4}"/>
-              </a:ext>
-            </a:extLst>
-          </p:cNvPr>
-          <p:cNvPicPr>
-            <a:picLocks noGrp="1" noChangeAspect="1"/>
-          </p:cNvPicPr>
+              <a:t>Next steps</a:t>
+            </a:r>
+          </a:p>
+        </p:txBody>
+      </p:sp>
+      <p:sp>
+        <p:nvSpPr>
+          <p:cNvPr id="3" name="Content Placeholder 2">
+            <a:extLst>
+              <a:ext uri="{FF2B5EF4-FFF2-40B4-BE49-F238E27FC236}">
+                <a16:creationId xmlns:a16="http://schemas.microsoft.com/office/drawing/2014/main" id="{0E336A5E-B3F2-6D02-2989-32EA44715CFC}"/>
+              </a:ext>
+            </a:extLst>
+          </p:cNvPr>
+          <p:cNvSpPr>
+            <a:spLocks noGrp="1"/>
+          </p:cNvSpPr>
           <p:nvPr>
             <p:ph idx="1"/>
           </p:nvPr>
-        </p:nvPicPr>
-        <p:blipFill>
-          <a:blip r:embed="rId2">
-            <a:extLst>
-              <a:ext uri="{28A0092B-C50C-407E-A947-70E740481C1C}">
-                <a14:useLocalDpi xmlns:a14="http://schemas.microsoft.com/office/drawing/2010/main" val="0"/>
-              </a:ext>
-              <a:ext uri="{96DAC541-7B7A-43D3-8B79-37D633B846F1}">
-                <asvg:svgBlip xmlns:asvg="http://schemas.microsoft.com/office/drawing/2016/SVG/main" r:embed="rId3"/>
-              </a:ext>
-            </a:extLst>
-          </a:blip>
-          <a:stretch>
-            <a:fillRect/>
-          </a:stretch>
-        </p:blipFill>
+        </p:nvSpPr>
+        <p:spPr/>
+        <p:txBody>
+          <a:bodyPr/>
+          <a:lstStyle/>
+          <a:p>
+            <a:r>
+              <a:rPr lang="en-GB" dirty="0"/>
+              <a:t>Confirmation/additions research focus from Solare Zukunft/ IZT</a:t>
+            </a:r>
+          </a:p>
+          <a:p>
+            <a:r>
+              <a:rPr lang="en-GB" dirty="0"/>
+              <a:t>Contact with schools and data collection</a:t>
+            </a:r>
+          </a:p>
+          <a:p>
+            <a:r>
+              <a:rPr lang="en-GB" dirty="0"/>
+              <a:t>Permits to conduct surveys at schools</a:t>
+            </a:r>
+          </a:p>
+          <a:p>
+            <a:r>
+              <a:rPr lang="en-GB" dirty="0"/>
+              <a:t>Contact existing data Lisa Pauli for analysis</a:t>
+            </a:r>
+          </a:p>
+          <a:p>
+            <a:endParaRPr lang="en-GB" dirty="0"/>
+          </a:p>
+          <a:p>
+            <a:endParaRPr lang="en-GB" dirty="0"/>
+          </a:p>
+          <a:p>
+            <a:r>
+              <a:rPr lang="en-GB" dirty="0"/>
+              <a:t>Official registration</a:t>
+            </a:r>
+          </a:p>
+        </p:txBody>
+      </p:sp>
+      <p:sp>
+        <p:nvSpPr>
+          <p:cNvPr id="5" name="Footer Placeholder 3">
+            <a:extLst>
+              <a:ext uri="{FF2B5EF4-FFF2-40B4-BE49-F238E27FC236}">
+                <a16:creationId xmlns:a16="http://schemas.microsoft.com/office/drawing/2014/main" id="{312E21E9-C0D9-E5CB-9748-AD3140FF9E26}"/>
+              </a:ext>
+            </a:extLst>
+          </p:cNvPr>
+          <p:cNvSpPr>
+            <a:spLocks noGrp="1"/>
+          </p:cNvSpPr>
+          <p:nvPr>
+            <p:ph type="ftr" sz="quarter" idx="11"/>
+          </p:nvPr>
+        </p:nvSpPr>
         <p:spPr>
           <a:xfrm>
-            <a:off x="1981200" y="2971800"/>
-            <a:ext cx="2171700" cy="2171700"/>
-          </a:xfrm>
-          <a:prstGeom prst="rect">
-            <a:avLst/>
-          </a:prstGeom>
-        </p:spPr>
-      </p:pic>
+            <a:off x="4038600" y="6356351"/>
+            <a:ext cx="4876800" cy="260350"/>
+          </a:xfrm>
+        </p:spPr>
+        <p:txBody>
+          <a:bodyPr/>
+          <a:lstStyle/>
+          <a:p>
+            <a:r>
+              <a:rPr lang="en-GB" dirty="0"/>
+              <a:t>Sustainability competences and participatory ESD || Dani Gargya || 03.04.24</a:t>
+            </a:r>
+          </a:p>
+        </p:txBody>
+      </p:sp>
       <p:pic>
         <p:nvPicPr>
-          <p:cNvPr id="6" name="Graphic 5" descr="Customer review">
-            <a:extLst>
-              <a:ext uri="{FF2B5EF4-FFF2-40B4-BE49-F238E27FC236}">
-                <a16:creationId xmlns:a16="http://schemas.microsoft.com/office/drawing/2014/main" id="{85AB3A92-6BFF-7370-4D86-D91C0734A4A5}"/>
-              </a:ext>
-            </a:extLst>
-          </p:cNvPr>
-          <p:cNvPicPr>
-            <a:picLocks noChangeAspect="1"/>
-          </p:cNvPicPr>
-          <p:nvPr/>
-        </p:nvPicPr>
-        <p:blipFill>
-          <a:blip r:embed="rId4">
-            <a:extLst>
-              <a:ext uri="{28A0092B-C50C-407E-A947-70E740481C1C}">
-                <a14:useLocalDpi xmlns:a14="http://schemas.microsoft.com/office/drawing/2010/main" val="0"/>
-              </a:ext>
-              <a:ext uri="{96DAC541-7B7A-43D3-8B79-37D633B846F1}">
-                <asvg:svgBlip xmlns:asvg="http://schemas.microsoft.com/office/drawing/2016/SVG/main" r:embed="rId5"/>
-              </a:ext>
-            </a:extLst>
-          </a:blip>
-          <a:stretch>
-            <a:fillRect/>
-          </a:stretch>
-        </p:blipFill>
-        <p:spPr>
-          <a:xfrm>
-            <a:off x="6875780" y="2903538"/>
-            <a:ext cx="2555240" cy="2555240"/>
-          </a:xfrm>
-          <a:prstGeom prst="rect">
-            <a:avLst/>
-          </a:prstGeom>
-        </p:spPr>
-      </p:pic>
-      <p:pic>
-        <p:nvPicPr>
-          <p:cNvPr id="7" name="Picture 2">
-            <a:extLst>
-              <a:ext uri="{FF2B5EF4-FFF2-40B4-BE49-F238E27FC236}">
-                <a16:creationId xmlns:a16="http://schemas.microsoft.com/office/drawing/2014/main" id="{CA526246-0242-DCBE-F16F-BEE45E58BFBC}"/>
+          <p:cNvPr id="4" name="Picture 2">
+            <a:extLst>
+              <a:ext uri="{FF2B5EF4-FFF2-40B4-BE49-F238E27FC236}">
+                <a16:creationId xmlns:a16="http://schemas.microsoft.com/office/drawing/2014/main" id="{A89F5D0D-5FA6-E3E4-E413-FE7F10ED7F59}"/>
               </a:ext>
             </a:extLst>
           </p:cNvPr>
@@ -5921,7 +6144,7 @@
           <p:nvPr/>
         </p:nvPicPr>
         <p:blipFill>
-          <a:blip r:embed="rId6">
+          <a:blip r:embed="rId2">
             <a:extLst>
               <a:ext uri="{28A0092B-C50C-407E-A947-70E740481C1C}">
                 <a14:useLocalDpi xmlns:a14="http://schemas.microsoft.com/office/drawing/2010/main" val="0"/>
@@ -5953,43 +6176,10 @@
           </a:extLst>
         </p:spPr>
       </p:pic>
-      <p:sp>
-        <p:nvSpPr>
-          <p:cNvPr id="3" name="Footer Placeholder 3">
-            <a:extLst>
-              <a:ext uri="{FF2B5EF4-FFF2-40B4-BE49-F238E27FC236}">
-                <a16:creationId xmlns:a16="http://schemas.microsoft.com/office/drawing/2014/main" id="{31A340E4-28ED-430A-2A8D-50F220858F03}"/>
-              </a:ext>
-            </a:extLst>
-          </p:cNvPr>
-          <p:cNvSpPr>
-            <a:spLocks noGrp="1"/>
-          </p:cNvSpPr>
-          <p:nvPr>
-            <p:ph type="ftr" sz="quarter" idx="11"/>
-          </p:nvPr>
-        </p:nvSpPr>
-        <p:spPr>
-          <a:xfrm>
-            <a:off x="4038600" y="6356351"/>
-            <a:ext cx="4876800" cy="260350"/>
-          </a:xfrm>
-        </p:spPr>
-        <p:txBody>
-          <a:bodyPr/>
-          <a:lstStyle/>
-          <a:p>
-            <a:r>
-              <a:rPr lang="en-GB" dirty="0"/>
-              <a:t>Sustainability competences and participatory ESD || Dani Gargya || 03.04.24</a:t>
-            </a:r>
-          </a:p>
-        </p:txBody>
-      </p:sp>
     </p:spTree>
     <p:extLst>
       <p:ext uri="{BB962C8B-B14F-4D97-AF65-F5344CB8AC3E}">
-        <p14:creationId xmlns:p14="http://schemas.microsoft.com/office/powerpoint/2010/main" val="231855734"/>
+        <p14:creationId xmlns:p14="http://schemas.microsoft.com/office/powerpoint/2010/main" val="1382564575"/>
       </p:ext>
     </p:extLst>
   </p:cSld>
@@ -6021,6 +6211,224 @@
           <p:cNvPr id="2" name="Title 1">
             <a:extLst>
               <a:ext uri="{FF2B5EF4-FFF2-40B4-BE49-F238E27FC236}">
+                <a16:creationId xmlns:a16="http://schemas.microsoft.com/office/drawing/2014/main" id="{FA2F5305-6816-4A4E-FFD0-99F5ED9D4D43}"/>
+              </a:ext>
+            </a:extLst>
+          </p:cNvPr>
+          <p:cNvSpPr>
+            <a:spLocks noGrp="1"/>
+          </p:cNvSpPr>
+          <p:nvPr>
+            <p:ph type="title"/>
+          </p:nvPr>
+        </p:nvSpPr>
+        <p:spPr/>
+        <p:txBody>
+          <a:bodyPr/>
+          <a:lstStyle/>
+          <a:p>
+            <a:r>
+              <a:rPr lang="en-GB" dirty="0"/>
+              <a:t>Questions and feedback</a:t>
+            </a:r>
+          </a:p>
+        </p:txBody>
+      </p:sp>
+      <p:pic>
+        <p:nvPicPr>
+          <p:cNvPr id="5" name="Content Placeholder 4" descr="Questions">
+            <a:extLst>
+              <a:ext uri="{FF2B5EF4-FFF2-40B4-BE49-F238E27FC236}">
+                <a16:creationId xmlns:a16="http://schemas.microsoft.com/office/drawing/2014/main" id="{6C22FE90-221C-866F-2C4A-E2D19BE009C4}"/>
+              </a:ext>
+            </a:extLst>
+          </p:cNvPr>
+          <p:cNvPicPr>
+            <a:picLocks noGrp="1" noChangeAspect="1"/>
+          </p:cNvPicPr>
+          <p:nvPr>
+            <p:ph idx="1"/>
+          </p:nvPr>
+        </p:nvPicPr>
+        <p:blipFill>
+          <a:blip r:embed="rId2">
+            <a:extLst>
+              <a:ext uri="{28A0092B-C50C-407E-A947-70E740481C1C}">
+                <a14:useLocalDpi xmlns:a14="http://schemas.microsoft.com/office/drawing/2010/main" val="0"/>
+              </a:ext>
+              <a:ext uri="{96DAC541-7B7A-43D3-8B79-37D633B846F1}">
+                <asvg:svgBlip xmlns:asvg="http://schemas.microsoft.com/office/drawing/2016/SVG/main" r:embed="rId3"/>
+              </a:ext>
+            </a:extLst>
+          </a:blip>
+          <a:stretch>
+            <a:fillRect/>
+          </a:stretch>
+        </p:blipFill>
+        <p:spPr>
+          <a:xfrm>
+            <a:off x="1981200" y="2971800"/>
+            <a:ext cx="2171700" cy="2171700"/>
+          </a:xfrm>
+          <a:prstGeom prst="rect">
+            <a:avLst/>
+          </a:prstGeom>
+        </p:spPr>
+      </p:pic>
+      <p:pic>
+        <p:nvPicPr>
+          <p:cNvPr id="6" name="Graphic 5" descr="Customer review">
+            <a:extLst>
+              <a:ext uri="{FF2B5EF4-FFF2-40B4-BE49-F238E27FC236}">
+                <a16:creationId xmlns:a16="http://schemas.microsoft.com/office/drawing/2014/main" id="{85AB3A92-6BFF-7370-4D86-D91C0734A4A5}"/>
+              </a:ext>
+            </a:extLst>
+          </p:cNvPr>
+          <p:cNvPicPr>
+            <a:picLocks noChangeAspect="1"/>
+          </p:cNvPicPr>
+          <p:nvPr/>
+        </p:nvPicPr>
+        <p:blipFill>
+          <a:blip r:embed="rId4">
+            <a:extLst>
+              <a:ext uri="{28A0092B-C50C-407E-A947-70E740481C1C}">
+                <a14:useLocalDpi xmlns:a14="http://schemas.microsoft.com/office/drawing/2010/main" val="0"/>
+              </a:ext>
+              <a:ext uri="{96DAC541-7B7A-43D3-8B79-37D633B846F1}">
+                <asvg:svgBlip xmlns:asvg="http://schemas.microsoft.com/office/drawing/2016/SVG/main" r:embed="rId5"/>
+              </a:ext>
+            </a:extLst>
+          </a:blip>
+          <a:stretch>
+            <a:fillRect/>
+          </a:stretch>
+        </p:blipFill>
+        <p:spPr>
+          <a:xfrm>
+            <a:off x="6875780" y="2903538"/>
+            <a:ext cx="2555240" cy="2555240"/>
+          </a:xfrm>
+          <a:prstGeom prst="rect">
+            <a:avLst/>
+          </a:prstGeom>
+        </p:spPr>
+      </p:pic>
+      <p:pic>
+        <p:nvPicPr>
+          <p:cNvPr id="7" name="Picture 2">
+            <a:extLst>
+              <a:ext uri="{FF2B5EF4-FFF2-40B4-BE49-F238E27FC236}">
+                <a16:creationId xmlns:a16="http://schemas.microsoft.com/office/drawing/2014/main" id="{CA526246-0242-DCBE-F16F-BEE45E58BFBC}"/>
+              </a:ext>
+            </a:extLst>
+          </p:cNvPr>
+          <p:cNvPicPr>
+            <a:picLocks noChangeAspect="1" noChangeArrowheads="1"/>
+          </p:cNvPicPr>
+          <p:nvPr/>
+        </p:nvPicPr>
+        <p:blipFill>
+          <a:blip r:embed="rId6">
+            <a:extLst>
+              <a:ext uri="{28A0092B-C50C-407E-A947-70E740481C1C}">
+                <a14:useLocalDpi xmlns:a14="http://schemas.microsoft.com/office/drawing/2010/main" val="0"/>
+              </a:ext>
+            </a:extLst>
+          </a:blip>
+          <a:srcRect/>
+          <a:stretch>
+            <a:fillRect/>
+          </a:stretch>
+        </p:blipFill>
+        <p:spPr bwMode="auto">
+          <a:xfrm>
+            <a:off x="10185401" y="0"/>
+            <a:ext cx="1853434" cy="2166938"/>
+          </a:xfrm>
+          <a:prstGeom prst="rect">
+            <a:avLst/>
+          </a:prstGeom>
+          <a:noFill/>
+          <a:extLst>
+            <a:ext uri="{909E8E84-426E-40DD-AFC4-6F175D3DCCD1}">
+              <a14:hiddenFill xmlns:a14="http://schemas.microsoft.com/office/drawing/2010/main">
+                <a:solidFill>
+                  <a:srgbClr val="FFFFFF"/>
+                </a:solidFill>
+              </a14:hiddenFill>
+            </a:ext>
+          </a:extLst>
+        </p:spPr>
+      </p:pic>
+      <p:sp>
+        <p:nvSpPr>
+          <p:cNvPr id="3" name="Footer Placeholder 3">
+            <a:extLst>
+              <a:ext uri="{FF2B5EF4-FFF2-40B4-BE49-F238E27FC236}">
+                <a16:creationId xmlns:a16="http://schemas.microsoft.com/office/drawing/2014/main" id="{31A340E4-28ED-430A-2A8D-50F220858F03}"/>
+              </a:ext>
+            </a:extLst>
+          </p:cNvPr>
+          <p:cNvSpPr>
+            <a:spLocks noGrp="1"/>
+          </p:cNvSpPr>
+          <p:nvPr>
+            <p:ph type="ftr" sz="quarter" idx="11"/>
+          </p:nvPr>
+        </p:nvSpPr>
+        <p:spPr>
+          <a:xfrm>
+            <a:off x="4038600" y="6356351"/>
+            <a:ext cx="4876800" cy="260350"/>
+          </a:xfrm>
+        </p:spPr>
+        <p:txBody>
+          <a:bodyPr/>
+          <a:lstStyle/>
+          <a:p>
+            <a:r>
+              <a:rPr lang="en-GB" dirty="0"/>
+              <a:t>Sustainability competences and participatory ESD || Dani Gargya || 03.04.24</a:t>
+            </a:r>
+          </a:p>
+        </p:txBody>
+      </p:sp>
+    </p:spTree>
+    <p:extLst>
+      <p:ext uri="{BB962C8B-B14F-4D97-AF65-F5344CB8AC3E}">
+        <p14:creationId xmlns:p14="http://schemas.microsoft.com/office/powerpoint/2010/main" val="231855734"/>
+      </p:ext>
+    </p:extLst>
+  </p:cSld>
+  <p:clrMapOvr>
+    <a:masterClrMapping/>
+  </p:clrMapOvr>
+</p:sld>
+</file>
+
+<file path=ppt/slides/slide16.xml><?xml version="1.0" encoding="utf-8"?>
+<p:sld xmlns:a="http://schemas.openxmlformats.org/drawingml/2006/main" xmlns:r="http://schemas.openxmlformats.org/officeDocument/2006/relationships" xmlns:p="http://schemas.openxmlformats.org/presentationml/2006/main">
+  <p:cSld>
+    <p:spTree>
+      <p:nvGrpSpPr>
+        <p:cNvPr id="1" name=""/>
+        <p:cNvGrpSpPr/>
+        <p:nvPr/>
+      </p:nvGrpSpPr>
+      <p:grpSpPr>
+        <a:xfrm>
+          <a:off x="0" y="0"/>
+          <a:ext cx="0" cy="0"/>
+          <a:chOff x="0" y="0"/>
+          <a:chExt cx="0" cy="0"/>
+        </a:xfrm>
+      </p:grpSpPr>
+      <p:sp>
+        <p:nvSpPr>
+          <p:cNvPr id="2" name="Title 1">
+            <a:extLst>
+              <a:ext uri="{FF2B5EF4-FFF2-40B4-BE49-F238E27FC236}">
                 <a16:creationId xmlns:a16="http://schemas.microsoft.com/office/drawing/2014/main" id="{8E3FC292-61FF-4A55-00E7-57EB811FBF11}"/>
               </a:ext>
             </a:extLst>
@@ -6109,6 +6517,53 @@
           </a:p>
         </p:txBody>
       </p:sp>
+      <p:pic>
+        <p:nvPicPr>
+          <p:cNvPr id="3" name="Picture 2">
+            <a:extLst>
+              <a:ext uri="{FF2B5EF4-FFF2-40B4-BE49-F238E27FC236}">
+                <a16:creationId xmlns:a16="http://schemas.microsoft.com/office/drawing/2014/main" id="{5EF4E067-9B16-2FED-8E2E-CDE1EDDCEBB3}"/>
+              </a:ext>
+            </a:extLst>
+          </p:cNvPr>
+          <p:cNvPicPr>
+            <a:picLocks noChangeAspect="1" noChangeArrowheads="1"/>
+          </p:cNvPicPr>
+          <p:nvPr/>
+        </p:nvPicPr>
+        <p:blipFill>
+          <a:blip r:embed="rId3">
+            <a:extLst>
+              <a:ext uri="{28A0092B-C50C-407E-A947-70E740481C1C}">
+                <a14:useLocalDpi xmlns:a14="http://schemas.microsoft.com/office/drawing/2010/main" val="0"/>
+              </a:ext>
+            </a:extLst>
+          </a:blip>
+          <a:srcRect/>
+          <a:stretch>
+            <a:fillRect/>
+          </a:stretch>
+        </p:blipFill>
+        <p:spPr bwMode="auto">
+          <a:xfrm>
+            <a:off x="10185401" y="0"/>
+            <a:ext cx="1853434" cy="2166938"/>
+          </a:xfrm>
+          <a:prstGeom prst="rect">
+            <a:avLst/>
+          </a:prstGeom>
+          <a:noFill/>
+          <a:extLst>
+            <a:ext uri="{909E8E84-426E-40DD-AFC4-6F175D3DCCD1}">
+              <a14:hiddenFill xmlns:a14="http://schemas.microsoft.com/office/drawing/2010/main">
+                <a:solidFill>
+                  <a:srgbClr val="FFFFFF"/>
+                </a:solidFill>
+              </a14:hiddenFill>
+            </a:ext>
+          </a:extLst>
+        </p:spPr>
+      </p:pic>
     </p:spTree>
     <p:extLst>
       <p:ext uri="{BB962C8B-B14F-4D97-AF65-F5344CB8AC3E}">
@@ -6122,7 +6577,7 @@
 </p:sld>
 </file>
 
-<file path=ppt/slides/slide16.xml><?xml version="1.0" encoding="utf-8"?>
+<file path=ppt/slides/slide17.xml><?xml version="1.0" encoding="utf-8"?>
 <p:sld xmlns:a="http://schemas.openxmlformats.org/drawingml/2006/main" xmlns:r="http://schemas.openxmlformats.org/officeDocument/2006/relationships" xmlns:p="http://schemas.openxmlformats.org/presentationml/2006/main">
   <p:cSld>
     <p:spTree>
@@ -7632,6 +8087,315 @@
           <p:cNvPr id="2" name="Title 1">
             <a:extLst>
               <a:ext uri="{FF2B5EF4-FFF2-40B4-BE49-F238E27FC236}">
+                <a16:creationId xmlns:a16="http://schemas.microsoft.com/office/drawing/2014/main" id="{28725F2F-1841-A0E1-9DCE-C2C68A172A63}"/>
+              </a:ext>
+            </a:extLst>
+          </p:cNvPr>
+          <p:cNvSpPr>
+            <a:spLocks noGrp="1"/>
+          </p:cNvSpPr>
+          <p:nvPr>
+            <p:ph type="title"/>
+          </p:nvPr>
+        </p:nvSpPr>
+        <p:spPr/>
+        <p:txBody>
+          <a:bodyPr/>
+          <a:lstStyle/>
+          <a:p>
+            <a:r>
+              <a:rPr lang="en-GB" dirty="0"/>
+              <a:t>Research design</a:t>
+            </a:r>
+          </a:p>
+        </p:txBody>
+      </p:sp>
+      <p:sp>
+        <p:nvSpPr>
+          <p:cNvPr id="3" name="Content Placeholder 2">
+            <a:extLst>
+              <a:ext uri="{FF2B5EF4-FFF2-40B4-BE49-F238E27FC236}">
+                <a16:creationId xmlns:a16="http://schemas.microsoft.com/office/drawing/2014/main" id="{551B72CC-E911-8E3B-5740-4CF08DBB2B7A}"/>
+              </a:ext>
+            </a:extLst>
+          </p:cNvPr>
+          <p:cNvSpPr>
+            <a:spLocks noGrp="1"/>
+          </p:cNvSpPr>
+          <p:nvPr>
+            <p:ph idx="1"/>
+          </p:nvPr>
+        </p:nvSpPr>
+        <p:spPr/>
+        <p:txBody>
+          <a:bodyPr/>
+          <a:lstStyle/>
+          <a:p>
+            <a:r>
+              <a:rPr lang="en-GB" dirty="0"/>
+              <a:t>Long-term focus with the same two schools as master thesis </a:t>
+            </a:r>
+            <a:br>
+              <a:rPr lang="en-GB" dirty="0"/>
+            </a:br>
+            <a:r>
+              <a:rPr lang="en-GB" dirty="0"/>
+              <a:t>Lisa Pauli last year (Angell, Goethe </a:t>
+            </a:r>
+            <a:r>
+              <a:rPr lang="en-GB" dirty="0" err="1"/>
+              <a:t>Emmendingen</a:t>
+            </a:r>
+            <a:r>
+              <a:rPr lang="en-GB" dirty="0"/>
+              <a:t>)</a:t>
+            </a:r>
+            <a:br>
+              <a:rPr lang="en-GB" dirty="0"/>
+            </a:br>
+            <a:endParaRPr lang="en-GB" dirty="0"/>
+          </a:p>
+          <a:p>
+            <a:r>
+              <a:rPr lang="en-GB" dirty="0"/>
+              <a:t>Using same survey as Pauli with focus on changes in climate attitudes and behaviour (quantitative research)</a:t>
+            </a:r>
+            <a:br>
+              <a:rPr lang="en-GB" dirty="0"/>
+            </a:br>
+            <a:endParaRPr lang="en-GB" dirty="0"/>
+          </a:p>
+          <a:p>
+            <a:r>
+              <a:rPr lang="en-GB" dirty="0"/>
+              <a:t>Conducting survey with same students (knowing their involvement during project is enough, no personalised data)</a:t>
+            </a:r>
+            <a:br>
+              <a:rPr lang="en-GB" dirty="0"/>
+            </a:br>
+            <a:endParaRPr lang="en-GB" dirty="0"/>
+          </a:p>
+          <a:p>
+            <a:r>
+              <a:rPr lang="en-GB" dirty="0"/>
+              <a:t>Complementing with survey on self-efficacy</a:t>
+            </a:r>
+          </a:p>
+        </p:txBody>
+      </p:sp>
+      <p:pic>
+        <p:nvPicPr>
+          <p:cNvPr id="5" name="Picture 2">
+            <a:extLst>
+              <a:ext uri="{FF2B5EF4-FFF2-40B4-BE49-F238E27FC236}">
+                <a16:creationId xmlns:a16="http://schemas.microsoft.com/office/drawing/2014/main" id="{CDF68A5F-395D-C806-4EA7-0E33C7AD4361}"/>
+              </a:ext>
+            </a:extLst>
+          </p:cNvPr>
+          <p:cNvPicPr>
+            <a:picLocks noChangeAspect="1" noChangeArrowheads="1"/>
+          </p:cNvPicPr>
+          <p:nvPr/>
+        </p:nvPicPr>
+        <p:blipFill>
+          <a:blip r:embed="rId3">
+            <a:extLst>
+              <a:ext uri="{28A0092B-C50C-407E-A947-70E740481C1C}">
+                <a14:useLocalDpi xmlns:a14="http://schemas.microsoft.com/office/drawing/2010/main" val="0"/>
+              </a:ext>
+            </a:extLst>
+          </a:blip>
+          <a:srcRect/>
+          <a:stretch>
+            <a:fillRect/>
+          </a:stretch>
+        </p:blipFill>
+        <p:spPr bwMode="auto">
+          <a:xfrm>
+            <a:off x="10185401" y="0"/>
+            <a:ext cx="1853434" cy="2166938"/>
+          </a:xfrm>
+          <a:prstGeom prst="rect">
+            <a:avLst/>
+          </a:prstGeom>
+          <a:noFill/>
+          <a:extLst>
+            <a:ext uri="{909E8E84-426E-40DD-AFC4-6F175D3DCCD1}">
+              <a14:hiddenFill xmlns:a14="http://schemas.microsoft.com/office/drawing/2010/main">
+                <a:solidFill>
+                  <a:srgbClr val="FFFFFF"/>
+                </a:solidFill>
+              </a14:hiddenFill>
+            </a:ext>
+          </a:extLst>
+        </p:spPr>
+      </p:pic>
+      <p:sp>
+        <p:nvSpPr>
+          <p:cNvPr id="6" name="Footer Placeholder 3">
+            <a:extLst>
+              <a:ext uri="{FF2B5EF4-FFF2-40B4-BE49-F238E27FC236}">
+                <a16:creationId xmlns:a16="http://schemas.microsoft.com/office/drawing/2014/main" id="{971CC746-B995-5E43-7AEF-07C26463267A}"/>
+              </a:ext>
+            </a:extLst>
+          </p:cNvPr>
+          <p:cNvSpPr txBox="1">
+            <a:spLocks/>
+          </p:cNvSpPr>
+          <p:nvPr/>
+        </p:nvSpPr>
+        <p:spPr>
+          <a:xfrm>
+            <a:off x="4038600" y="6356351"/>
+            <a:ext cx="4876800" cy="260350"/>
+          </a:xfrm>
+          <a:prstGeom prst="rect">
+            <a:avLst/>
+          </a:prstGeom>
+        </p:spPr>
+        <p:txBody>
+          <a:bodyPr vert="horz" lIns="91440" tIns="45720" rIns="91440" bIns="45720" rtlCol="0" anchor="ctr"/>
+          <a:lstStyle>
+            <a:defPPr>
+              <a:defRPr lang="en-US"/>
+            </a:defPPr>
+            <a:lvl1pPr marL="0" algn="ctr" defTabSz="914400" rtl="0" eaLnBrk="1" latinLnBrk="0" hangingPunct="1">
+              <a:defRPr sz="1200" kern="1200">
+                <a:solidFill>
+                  <a:schemeClr val="tx1">
+                    <a:tint val="82000"/>
+                  </a:schemeClr>
+                </a:solidFill>
+                <a:latin typeface="+mn-lt"/>
+                <a:ea typeface="+mn-ea"/>
+                <a:cs typeface="+mn-cs"/>
+              </a:defRPr>
+            </a:lvl1pPr>
+            <a:lvl2pPr marL="457200" algn="l" defTabSz="914400" rtl="0" eaLnBrk="1" latinLnBrk="0" hangingPunct="1">
+              <a:defRPr sz="1800" kern="1200">
+                <a:solidFill>
+                  <a:schemeClr val="tx1"/>
+                </a:solidFill>
+                <a:latin typeface="+mn-lt"/>
+                <a:ea typeface="+mn-ea"/>
+                <a:cs typeface="+mn-cs"/>
+              </a:defRPr>
+            </a:lvl2pPr>
+            <a:lvl3pPr marL="914400" algn="l" defTabSz="914400" rtl="0" eaLnBrk="1" latinLnBrk="0" hangingPunct="1">
+              <a:defRPr sz="1800" kern="1200">
+                <a:solidFill>
+                  <a:schemeClr val="tx1"/>
+                </a:solidFill>
+                <a:latin typeface="+mn-lt"/>
+                <a:ea typeface="+mn-ea"/>
+                <a:cs typeface="+mn-cs"/>
+              </a:defRPr>
+            </a:lvl3pPr>
+            <a:lvl4pPr marL="1371600" algn="l" defTabSz="914400" rtl="0" eaLnBrk="1" latinLnBrk="0" hangingPunct="1">
+              <a:defRPr sz="1800" kern="1200">
+                <a:solidFill>
+                  <a:schemeClr val="tx1"/>
+                </a:solidFill>
+                <a:latin typeface="+mn-lt"/>
+                <a:ea typeface="+mn-ea"/>
+                <a:cs typeface="+mn-cs"/>
+              </a:defRPr>
+            </a:lvl4pPr>
+            <a:lvl5pPr marL="1828800" algn="l" defTabSz="914400" rtl="0" eaLnBrk="1" latinLnBrk="0" hangingPunct="1">
+              <a:defRPr sz="1800" kern="1200">
+                <a:solidFill>
+                  <a:schemeClr val="tx1"/>
+                </a:solidFill>
+                <a:latin typeface="+mn-lt"/>
+                <a:ea typeface="+mn-ea"/>
+                <a:cs typeface="+mn-cs"/>
+              </a:defRPr>
+            </a:lvl5pPr>
+            <a:lvl6pPr marL="2286000" algn="l" defTabSz="914400" rtl="0" eaLnBrk="1" latinLnBrk="0" hangingPunct="1">
+              <a:defRPr sz="1800" kern="1200">
+                <a:solidFill>
+                  <a:schemeClr val="tx1"/>
+                </a:solidFill>
+                <a:latin typeface="+mn-lt"/>
+                <a:ea typeface="+mn-ea"/>
+                <a:cs typeface="+mn-cs"/>
+              </a:defRPr>
+            </a:lvl6pPr>
+            <a:lvl7pPr marL="2743200" algn="l" defTabSz="914400" rtl="0" eaLnBrk="1" latinLnBrk="0" hangingPunct="1">
+              <a:defRPr sz="1800" kern="1200">
+                <a:solidFill>
+                  <a:schemeClr val="tx1"/>
+                </a:solidFill>
+                <a:latin typeface="+mn-lt"/>
+                <a:ea typeface="+mn-ea"/>
+                <a:cs typeface="+mn-cs"/>
+              </a:defRPr>
+            </a:lvl7pPr>
+            <a:lvl8pPr marL="3200400" algn="l" defTabSz="914400" rtl="0" eaLnBrk="1" latinLnBrk="0" hangingPunct="1">
+              <a:defRPr sz="1800" kern="1200">
+                <a:solidFill>
+                  <a:schemeClr val="tx1"/>
+                </a:solidFill>
+                <a:latin typeface="+mn-lt"/>
+                <a:ea typeface="+mn-ea"/>
+                <a:cs typeface="+mn-cs"/>
+              </a:defRPr>
+            </a:lvl8pPr>
+            <a:lvl9pPr marL="3657600" algn="l" defTabSz="914400" rtl="0" eaLnBrk="1" latinLnBrk="0" hangingPunct="1">
+              <a:defRPr sz="1800" kern="1200">
+                <a:solidFill>
+                  <a:schemeClr val="tx1"/>
+                </a:solidFill>
+                <a:latin typeface="+mn-lt"/>
+                <a:ea typeface="+mn-ea"/>
+                <a:cs typeface="+mn-cs"/>
+              </a:defRPr>
+            </a:lvl9pPr>
+          </a:lstStyle>
+          <a:p>
+            <a:r>
+              <a:rPr lang="en-GB"/>
+              <a:t>Sustainability competences and participatory ESD || Dani Gargya || 03.04.24</a:t>
+            </a:r>
+            <a:endParaRPr lang="en-GB" dirty="0"/>
+          </a:p>
+        </p:txBody>
+      </p:sp>
+    </p:spTree>
+    <p:extLst>
+      <p:ext uri="{BB962C8B-B14F-4D97-AF65-F5344CB8AC3E}">
+        <p14:creationId xmlns:p14="http://schemas.microsoft.com/office/powerpoint/2010/main" val="3378260120"/>
+      </p:ext>
+    </p:extLst>
+  </p:cSld>
+  <p:clrMapOvr>
+    <a:masterClrMapping/>
+  </p:clrMapOvr>
+</p:sld>
+</file>
+
+<file path=ppt/slides/slide7.xml><?xml version="1.0" encoding="utf-8"?>
+<p:sld xmlns:a="http://schemas.openxmlformats.org/drawingml/2006/main" xmlns:r="http://schemas.openxmlformats.org/officeDocument/2006/relationships" xmlns:p="http://schemas.openxmlformats.org/presentationml/2006/main">
+  <p:cSld>
+    <p:spTree>
+      <p:nvGrpSpPr>
+        <p:cNvPr id="1" name=""/>
+        <p:cNvGrpSpPr/>
+        <p:nvPr/>
+      </p:nvGrpSpPr>
+      <p:grpSpPr>
+        <a:xfrm>
+          <a:off x="0" y="0"/>
+          <a:ext cx="0" cy="0"/>
+          <a:chOff x="0" y="0"/>
+          <a:chExt cx="0" cy="0"/>
+        </a:xfrm>
+      </p:grpSpPr>
+      <p:sp>
+        <p:nvSpPr>
+          <p:cNvPr id="2" name="Title 1">
+            <a:extLst>
+              <a:ext uri="{FF2B5EF4-FFF2-40B4-BE49-F238E27FC236}">
                 <a16:creationId xmlns:a16="http://schemas.microsoft.com/office/drawing/2014/main" id="{B35066E2-AE52-8165-C3A5-7CC6653AAE06}"/>
               </a:ext>
             </a:extLst>
@@ -9759,6 +10523,53 @@
           </a:fontRef>
         </p:style>
       </p:cxnSp>
+      <p:pic>
+        <p:nvPicPr>
+          <p:cNvPr id="3" name="Picture 2">
+            <a:extLst>
+              <a:ext uri="{FF2B5EF4-FFF2-40B4-BE49-F238E27FC236}">
+                <a16:creationId xmlns:a16="http://schemas.microsoft.com/office/drawing/2014/main" id="{9A761BD6-B3AA-2FCB-F0C3-FC5BA6D31F67}"/>
+              </a:ext>
+            </a:extLst>
+          </p:cNvPr>
+          <p:cNvPicPr>
+            <a:picLocks noChangeAspect="1" noChangeArrowheads="1"/>
+          </p:cNvPicPr>
+          <p:nvPr/>
+        </p:nvPicPr>
+        <p:blipFill>
+          <a:blip r:embed="rId26">
+            <a:extLst>
+              <a:ext uri="{28A0092B-C50C-407E-A947-70E740481C1C}">
+                <a14:useLocalDpi xmlns:a14="http://schemas.microsoft.com/office/drawing/2010/main" val="0"/>
+              </a:ext>
+            </a:extLst>
+          </a:blip>
+          <a:srcRect/>
+          <a:stretch>
+            <a:fillRect/>
+          </a:stretch>
+        </p:blipFill>
+        <p:spPr bwMode="auto">
+          <a:xfrm>
+            <a:off x="10185401" y="0"/>
+            <a:ext cx="1853434" cy="2166938"/>
+          </a:xfrm>
+          <a:prstGeom prst="rect">
+            <a:avLst/>
+          </a:prstGeom>
+          <a:noFill/>
+          <a:extLst>
+            <a:ext uri="{909E8E84-426E-40DD-AFC4-6F175D3DCCD1}">
+              <a14:hiddenFill xmlns:a14="http://schemas.microsoft.com/office/drawing/2010/main">
+                <a:solidFill>
+                  <a:srgbClr val="FFFFFF"/>
+                </a:solidFill>
+              </a14:hiddenFill>
+            </a:ext>
+          </a:extLst>
+        </p:spPr>
+      </p:pic>
     </p:spTree>
     <p:extLst>
       <p:ext uri="{BB962C8B-B14F-4D97-AF65-F5344CB8AC3E}">
@@ -9772,7 +10583,7 @@
 </p:sld>
 </file>
 
-<file path=ppt/slides/slide7.xml><?xml version="1.0" encoding="utf-8"?>
+<file path=ppt/slides/slide8.xml><?xml version="1.0" encoding="utf-8"?>
 <p:sld xmlns:a="http://schemas.openxmlformats.org/drawingml/2006/main" xmlns:r="http://schemas.openxmlformats.org/officeDocument/2006/relationships" xmlns:p="http://schemas.openxmlformats.org/presentationml/2006/main">
   <p:cSld>
     <p:spTree>
@@ -9972,7 +10783,7 @@
 </p:sld>
 </file>
 
-<file path=ppt/slides/slide8.xml><?xml version="1.0" encoding="utf-8"?>
+<file path=ppt/slides/slide9.xml><?xml version="1.0" encoding="utf-8"?>
 <p:sld xmlns:a="http://schemas.openxmlformats.org/drawingml/2006/main" xmlns:r="http://schemas.openxmlformats.org/officeDocument/2006/relationships" xmlns:p="http://schemas.openxmlformats.org/presentationml/2006/main">
   <p:cSld>
     <p:spTree>
@@ -11107,105 +11918,12 @@
           </a:p>
         </p:txBody>
       </p:sp>
-    </p:spTree>
-    <p:extLst>
-      <p:ext uri="{BB962C8B-B14F-4D97-AF65-F5344CB8AC3E}">
-        <p14:creationId xmlns:p14="http://schemas.microsoft.com/office/powerpoint/2010/main" val="1034015600"/>
-      </p:ext>
-    </p:extLst>
-  </p:cSld>
-  <p:clrMapOvr>
-    <a:masterClrMapping/>
-  </p:clrMapOvr>
-</p:sld>
-</file>
-
-<file path=ppt/slides/slide9.xml><?xml version="1.0" encoding="utf-8"?>
-<p:sld xmlns:a="http://schemas.openxmlformats.org/drawingml/2006/main" xmlns:r="http://schemas.openxmlformats.org/officeDocument/2006/relationships" xmlns:p="http://schemas.openxmlformats.org/presentationml/2006/main">
-  <p:cSld>
-    <p:spTree>
-      <p:nvGrpSpPr>
-        <p:cNvPr id="1" name=""/>
-        <p:cNvGrpSpPr/>
-        <p:nvPr/>
-      </p:nvGrpSpPr>
-      <p:grpSpPr>
-        <a:xfrm>
-          <a:off x="0" y="0"/>
-          <a:ext cx="0" cy="0"/>
-          <a:chOff x="0" y="0"/>
-          <a:chExt cx="0" cy="0"/>
-        </a:xfrm>
-      </p:grpSpPr>
-      <p:sp>
-        <p:nvSpPr>
-          <p:cNvPr id="2" name="Title 1">
-            <a:extLst>
-              <a:ext uri="{FF2B5EF4-FFF2-40B4-BE49-F238E27FC236}">
-                <a16:creationId xmlns:a16="http://schemas.microsoft.com/office/drawing/2014/main" id="{49939984-9A30-344A-0C72-F25E4D90D72D}"/>
-              </a:ext>
-            </a:extLst>
-          </p:cNvPr>
-          <p:cNvSpPr>
-            <a:spLocks noGrp="1"/>
-          </p:cNvSpPr>
-          <p:nvPr>
-            <p:ph type="title"/>
-          </p:nvPr>
-        </p:nvSpPr>
-        <p:spPr/>
-        <p:txBody>
-          <a:bodyPr/>
-          <a:lstStyle/>
-          <a:p>
-            <a:r>
-              <a:rPr lang="en-GB" dirty="0"/>
-              <a:t>Methods – </a:t>
-            </a:r>
-            <a:br>
-              <a:rPr lang="en-GB" dirty="0"/>
-            </a:br>
-            <a:r>
-              <a:rPr lang="en-GB" dirty="0"/>
-              <a:t>Surveys</a:t>
-            </a:r>
-          </a:p>
-        </p:txBody>
-      </p:sp>
-      <p:sp>
-        <p:nvSpPr>
-          <p:cNvPr id="4" name="Footer Placeholder 3">
-            <a:extLst>
-              <a:ext uri="{FF2B5EF4-FFF2-40B4-BE49-F238E27FC236}">
-                <a16:creationId xmlns:a16="http://schemas.microsoft.com/office/drawing/2014/main" id="{101A3F43-341D-3AF1-CF7A-A6C17DB6FD41}"/>
-              </a:ext>
-            </a:extLst>
-          </p:cNvPr>
-          <p:cNvSpPr>
-            <a:spLocks noGrp="1"/>
-          </p:cNvSpPr>
-          <p:nvPr>
-            <p:ph type="ftr" sz="quarter" idx="11"/>
-          </p:nvPr>
-        </p:nvSpPr>
-        <p:spPr/>
-        <p:txBody>
-          <a:bodyPr/>
-          <a:lstStyle/>
-          <a:p>
-            <a:r>
-              <a:rPr lang="en-GB"/>
-              <a:t>Self-efficacy beliefs and participatory SDE || Dani Gargya || 06.03.24</a:t>
-            </a:r>
-          </a:p>
-        </p:txBody>
-      </p:sp>
       <p:pic>
         <p:nvPicPr>
-          <p:cNvPr id="5" name="Picture 2">
-            <a:extLst>
-              <a:ext uri="{FF2B5EF4-FFF2-40B4-BE49-F238E27FC236}">
-                <a16:creationId xmlns:a16="http://schemas.microsoft.com/office/drawing/2014/main" id="{178A05FA-0832-DCD6-F94B-0B0EF287E97A}"/>
+          <p:cNvPr id="4" name="Picture 2">
+            <a:extLst>
+              <a:ext uri="{FF2B5EF4-FFF2-40B4-BE49-F238E27FC236}">
+                <a16:creationId xmlns:a16="http://schemas.microsoft.com/office/drawing/2014/main" id="{F6E9324A-5E77-34BC-4BE6-82B3F673741B}"/>
               </a:ext>
             </a:extLst>
           </p:cNvPr>
@@ -11215,7 +11933,7 @@
           <p:nvPr/>
         </p:nvPicPr>
         <p:blipFill>
-          <a:blip r:embed="rId2">
+          <a:blip r:embed="rId12">
             <a:extLst>
               <a:ext uri="{28A0092B-C50C-407E-A947-70E740481C1C}">
                 <a14:useLocalDpi xmlns:a14="http://schemas.microsoft.com/office/drawing/2010/main" val="0"/>
@@ -11247,133 +11965,10 @@
           </a:extLst>
         </p:spPr>
       </p:pic>
-      <p:grpSp>
-        <p:nvGrpSpPr>
-          <p:cNvPr id="10" name="Group 9">
-            <a:extLst>
-              <a:ext uri="{FF2B5EF4-FFF2-40B4-BE49-F238E27FC236}">
-                <a16:creationId xmlns:a16="http://schemas.microsoft.com/office/drawing/2014/main" id="{D1586986-0D81-D4CC-75E7-8B1B45C0E99B}"/>
-              </a:ext>
-            </a:extLst>
-          </p:cNvPr>
-          <p:cNvGrpSpPr/>
-          <p:nvPr/>
-        </p:nvGrpSpPr>
-        <p:grpSpPr>
-          <a:xfrm>
-            <a:off x="3913900" y="136525"/>
-            <a:ext cx="4114801" cy="6180716"/>
-            <a:chOff x="3752729" y="136525"/>
-            <a:chExt cx="4686541" cy="6928207"/>
-          </a:xfrm>
-        </p:grpSpPr>
-        <p:pic>
-          <p:nvPicPr>
-            <p:cNvPr id="6" name="Picture 5">
-              <a:extLst>
-                <a:ext uri="{FF2B5EF4-FFF2-40B4-BE49-F238E27FC236}">
-                  <a16:creationId xmlns:a16="http://schemas.microsoft.com/office/drawing/2014/main" id="{22AC2898-02F7-9122-A6BE-9096975A3917}"/>
-                </a:ext>
-              </a:extLst>
-            </p:cNvPr>
-            <p:cNvPicPr>
-              <a:picLocks noChangeAspect="1"/>
-            </p:cNvPicPr>
-            <p:nvPr/>
-          </p:nvPicPr>
-          <p:blipFill>
-            <a:blip r:embed="rId3"/>
-            <a:stretch>
-              <a:fillRect/>
-            </a:stretch>
-          </p:blipFill>
-          <p:spPr>
-            <a:xfrm>
-              <a:off x="3752729" y="136525"/>
-              <a:ext cx="4686541" cy="4210266"/>
-            </a:xfrm>
-            <a:prstGeom prst="rect">
-              <a:avLst/>
-            </a:prstGeom>
-          </p:spPr>
-        </p:pic>
-        <p:pic>
-          <p:nvPicPr>
-            <p:cNvPr id="9" name="Picture 8">
-              <a:extLst>
-                <a:ext uri="{FF2B5EF4-FFF2-40B4-BE49-F238E27FC236}">
-                  <a16:creationId xmlns:a16="http://schemas.microsoft.com/office/drawing/2014/main" id="{28A507F9-5F72-0559-AE6B-D8F1E0DE3A65}"/>
-                </a:ext>
-              </a:extLst>
-            </p:cNvPr>
-            <p:cNvPicPr>
-              <a:picLocks noChangeAspect="1"/>
-            </p:cNvPicPr>
-            <p:nvPr/>
-          </p:nvPicPr>
-          <p:blipFill>
-            <a:blip r:embed="rId4"/>
-            <a:stretch>
-              <a:fillRect/>
-            </a:stretch>
-          </p:blipFill>
-          <p:spPr>
-            <a:xfrm>
-              <a:off x="3752729" y="4315041"/>
-              <a:ext cx="4673840" cy="2749691"/>
-            </a:xfrm>
-            <a:prstGeom prst="rect">
-              <a:avLst/>
-            </a:prstGeom>
-          </p:spPr>
-        </p:pic>
-      </p:grpSp>
-      <p:sp>
-        <p:nvSpPr>
-          <p:cNvPr id="11" name="TextBox 10">
-            <a:extLst>
-              <a:ext uri="{FF2B5EF4-FFF2-40B4-BE49-F238E27FC236}">
-                <a16:creationId xmlns:a16="http://schemas.microsoft.com/office/drawing/2014/main" id="{D2D6C47A-F1FD-3AEC-5A76-B262080039F9}"/>
-              </a:ext>
-            </a:extLst>
-          </p:cNvPr>
-          <p:cNvSpPr txBox="1"/>
-          <p:nvPr/>
-        </p:nvSpPr>
-        <p:spPr>
-          <a:xfrm>
-            <a:off x="838200" y="2166938"/>
-            <a:ext cx="2468526" cy="923330"/>
-          </a:xfrm>
-          <a:prstGeom prst="rect">
-            <a:avLst/>
-          </a:prstGeom>
-          <a:noFill/>
-        </p:spPr>
-        <p:txBody>
-          <a:bodyPr wrap="square" rtlCol="0">
-            <a:spAutoFit/>
-          </a:bodyPr>
-          <a:lstStyle/>
-          <a:p>
-            <a:r>
-              <a:rPr lang="en-GB" dirty="0"/>
-              <a:t>Sustainability attitudes and behaviour – </a:t>
-            </a:r>
-            <a:br>
-              <a:rPr lang="en-GB" dirty="0"/>
-            </a:br>
-            <a:r>
-              <a:rPr lang="en-GB" dirty="0"/>
-              <a:t>based on MA Lisa Pauli</a:t>
-            </a:r>
-          </a:p>
-        </p:txBody>
-      </p:sp>
     </p:spTree>
     <p:extLst>
       <p:ext uri="{BB962C8B-B14F-4D97-AF65-F5344CB8AC3E}">
-        <p14:creationId xmlns:p14="http://schemas.microsoft.com/office/powerpoint/2010/main" val="3992079478"/>
+        <p14:creationId xmlns:p14="http://schemas.microsoft.com/office/powerpoint/2010/main" val="1034015600"/>
       </p:ext>
     </p:extLst>
   </p:cSld>

</xml_diff>